<commit_message>
Exerc FlexBox, Grid Layout
</commit_message>
<xml_diff>
--- a/01 Classes/Aula 05 e 06 Desenvolvimento Web - CSS.pptx
+++ b/01 Classes/Aula 05 e 06 Desenvolvimento Web - CSS.pptx
@@ -5,7 +5,7 @@
     <p:sldMasterId id="2147483648" r:id="rId1"/>
   </p:sldMasterIdLst>
   <p:notesMasterIdLst>
-    <p:notesMasterId r:id="rId60"/>
+    <p:notesMasterId r:id="rId61"/>
   </p:notesMasterIdLst>
   <p:sldIdLst>
     <p:sldId id="256" r:id="rId2"/>
@@ -56,16 +56,17 @@
     <p:sldId id="424" r:id="rId47"/>
     <p:sldId id="425" r:id="rId48"/>
     <p:sldId id="426" r:id="rId49"/>
-    <p:sldId id="427" r:id="rId50"/>
-    <p:sldId id="428" r:id="rId51"/>
-    <p:sldId id="429" r:id="rId52"/>
-    <p:sldId id="430" r:id="rId53"/>
-    <p:sldId id="431" r:id="rId54"/>
-    <p:sldId id="333" r:id="rId55"/>
-    <p:sldId id="323" r:id="rId56"/>
-    <p:sldId id="334" r:id="rId57"/>
-    <p:sldId id="337" r:id="rId58"/>
-    <p:sldId id="309" r:id="rId59"/>
+    <p:sldId id="438" r:id="rId50"/>
+    <p:sldId id="427" r:id="rId51"/>
+    <p:sldId id="428" r:id="rId52"/>
+    <p:sldId id="429" r:id="rId53"/>
+    <p:sldId id="430" r:id="rId54"/>
+    <p:sldId id="431" r:id="rId55"/>
+    <p:sldId id="333" r:id="rId56"/>
+    <p:sldId id="323" r:id="rId57"/>
+    <p:sldId id="334" r:id="rId58"/>
+    <p:sldId id="337" r:id="rId59"/>
+    <p:sldId id="309" r:id="rId60"/>
   </p:sldIdLst>
   <p:sldSz cx="9144000" cy="5143500" type="screen16x9"/>
   <p:notesSz cx="6858000" cy="9144000"/>
@@ -3313,7 +3314,7 @@
     </p:spTree>
     <p:extLst>
       <p:ext uri="{BB962C8B-B14F-4D97-AF65-F5344CB8AC3E}">
-        <p14:creationId xmlns:p14="http://schemas.microsoft.com/office/powerpoint/2010/main" val="2052278355"/>
+        <p14:creationId xmlns:p14="http://schemas.microsoft.com/office/powerpoint/2010/main" val="1434788357"/>
       </p:ext>
     </p:extLst>
   </p:cSld>
@@ -3379,7 +3380,7 @@
     </p:spTree>
     <p:extLst>
       <p:ext uri="{BB962C8B-B14F-4D97-AF65-F5344CB8AC3E}">
-        <p14:creationId xmlns:p14="http://schemas.microsoft.com/office/powerpoint/2010/main" val="2604452415"/>
+        <p14:creationId xmlns:p14="http://schemas.microsoft.com/office/powerpoint/2010/main" val="2052278355"/>
       </p:ext>
     </p:extLst>
   </p:cSld>
@@ -3445,7 +3446,7 @@
     </p:spTree>
     <p:extLst>
       <p:ext uri="{BB962C8B-B14F-4D97-AF65-F5344CB8AC3E}">
-        <p14:creationId xmlns:p14="http://schemas.microsoft.com/office/powerpoint/2010/main" val="3062920628"/>
+        <p14:creationId xmlns:p14="http://schemas.microsoft.com/office/powerpoint/2010/main" val="2604452415"/>
       </p:ext>
     </p:extLst>
   </p:cSld>
@@ -3577,7 +3578,7 @@
     </p:spTree>
     <p:extLst>
       <p:ext uri="{BB962C8B-B14F-4D97-AF65-F5344CB8AC3E}">
-        <p14:creationId xmlns:p14="http://schemas.microsoft.com/office/powerpoint/2010/main" val="57841461"/>
+        <p14:creationId xmlns:p14="http://schemas.microsoft.com/office/powerpoint/2010/main" val="3062920628"/>
       </p:ext>
     </p:extLst>
   </p:cSld>
@@ -3643,7 +3644,7 @@
     </p:spTree>
     <p:extLst>
       <p:ext uri="{BB962C8B-B14F-4D97-AF65-F5344CB8AC3E}">
-        <p14:creationId xmlns:p14="http://schemas.microsoft.com/office/powerpoint/2010/main" val="2189211874"/>
+        <p14:creationId xmlns:p14="http://schemas.microsoft.com/office/powerpoint/2010/main" val="57841461"/>
       </p:ext>
     </p:extLst>
   </p:cSld>
@@ -3709,7 +3710,7 @@
     </p:spTree>
     <p:extLst>
       <p:ext uri="{BB962C8B-B14F-4D97-AF65-F5344CB8AC3E}">
-        <p14:creationId xmlns:p14="http://schemas.microsoft.com/office/powerpoint/2010/main" val="585304384"/>
+        <p14:creationId xmlns:p14="http://schemas.microsoft.com/office/powerpoint/2010/main" val="2189211874"/>
       </p:ext>
     </p:extLst>
   </p:cSld>
@@ -3775,7 +3776,7 @@
     </p:spTree>
     <p:extLst>
       <p:ext uri="{BB962C8B-B14F-4D97-AF65-F5344CB8AC3E}">
-        <p14:creationId xmlns:p14="http://schemas.microsoft.com/office/powerpoint/2010/main" val="2709569597"/>
+        <p14:creationId xmlns:p14="http://schemas.microsoft.com/office/powerpoint/2010/main" val="585304384"/>
       </p:ext>
     </p:extLst>
   </p:cSld>
@@ -3841,6 +3842,72 @@
     </p:spTree>
     <p:extLst>
       <p:ext uri="{BB962C8B-B14F-4D97-AF65-F5344CB8AC3E}">
+        <p14:creationId xmlns:p14="http://schemas.microsoft.com/office/powerpoint/2010/main" val="2709569597"/>
+      </p:ext>
+    </p:extLst>
+  </p:cSld>
+  <p:clrMapOvr>
+    <a:masterClrMapping/>
+  </p:clrMapOvr>
+</p:notes>
+</file>
+
+<file path=ppt/notesSlides/notesSlide55.xml><?xml version="1.0" encoding="utf-8"?>
+<p:notes xmlns:a="http://schemas.openxmlformats.org/drawingml/2006/main" xmlns:r="http://schemas.openxmlformats.org/officeDocument/2006/relationships" xmlns:p="http://schemas.openxmlformats.org/presentationml/2006/main">
+  <p:cSld>
+    <p:spTree>
+      <p:nvGrpSpPr>
+        <p:cNvPr id="1" name=""/>
+        <p:cNvGrpSpPr/>
+        <p:nvPr/>
+      </p:nvGrpSpPr>
+      <p:grpSpPr>
+        <a:xfrm>
+          <a:off x="0" y="0"/>
+          <a:ext cx="0" cy="0"/>
+          <a:chOff x="0" y="0"/>
+          <a:chExt cx="0" cy="0"/>
+        </a:xfrm>
+      </p:grpSpPr>
+      <p:sp>
+        <p:nvSpPr>
+          <p:cNvPr id="2" name="Espaço Reservado para Imagem de Slide 1"/>
+          <p:cNvSpPr>
+            <a:spLocks noGrp="1" noRot="1" noChangeAspect="1"/>
+          </p:cNvSpPr>
+          <p:nvPr>
+            <p:ph type="sldImg"/>
+          </p:nvPr>
+        </p:nvSpPr>
+        <p:spPr>
+          <a:xfrm>
+            <a:off x="381000" y="685800"/>
+            <a:ext cx="6096000" cy="3429000"/>
+          </a:xfrm>
+        </p:spPr>
+      </p:sp>
+      <p:sp>
+        <p:nvSpPr>
+          <p:cNvPr id="3" name="Espaço Reservado para Anotações 2"/>
+          <p:cNvSpPr>
+            <a:spLocks noGrp="1"/>
+          </p:cNvSpPr>
+          <p:nvPr>
+            <p:ph type="body" idx="1"/>
+          </p:nvPr>
+        </p:nvSpPr>
+        <p:spPr/>
+        <p:txBody>
+          <a:bodyPr/>
+          <a:lstStyle/>
+          <a:p>
+            <a:endParaRPr lang="pt-BR" dirty="0"/>
+          </a:p>
+        </p:txBody>
+      </p:sp>
+    </p:spTree>
+    <p:extLst>
+      <p:ext uri="{BB962C8B-B14F-4D97-AF65-F5344CB8AC3E}">
         <p14:creationId xmlns:p14="http://schemas.microsoft.com/office/powerpoint/2010/main" val="2296249050"/>
       </p:ext>
     </p:extLst>
@@ -3851,7 +3918,7 @@
 </p:notes>
 </file>
 
-<file path=ppt/notesSlides/notesSlide55.xml><?xml version="1.0" encoding="utf-8"?>
+<file path=ppt/notesSlides/notesSlide56.xml><?xml version="1.0" encoding="utf-8"?>
 <p:notes xmlns:a="http://schemas.openxmlformats.org/drawingml/2006/main" xmlns:r="http://schemas.openxmlformats.org/officeDocument/2006/relationships" xmlns:p="http://schemas.openxmlformats.org/presentationml/2006/main">
   <p:cSld>
     <p:spTree>
@@ -20669,18 +20736,6 @@
             <a:pPr marL="0" indent="0" algn="just">
               <a:buNone/>
             </a:pPr>
-            <a:endParaRPr lang="pt-BR" dirty="0">
-              <a:solidFill>
-                <a:schemeClr val="tx1"/>
-              </a:solidFill>
-              <a:latin typeface="Times New Roman" panose="02020603050405020304" pitchFamily="18" charset="0"/>
-              <a:cs typeface="Times New Roman" panose="02020603050405020304" pitchFamily="18" charset="0"/>
-            </a:endParaRPr>
-          </a:p>
-          <a:p>
-            <a:pPr marL="0" indent="0" algn="just">
-              <a:buNone/>
-            </a:pPr>
             <a:r>
               <a:rPr lang="pt-BR" dirty="0">
                 <a:solidFill>
@@ -20857,6 +20912,313 @@
             <a:pPr marL="0" indent="0" algn="just">
               <a:buNone/>
             </a:pPr>
+            <a:r>
+              <a:rPr lang="pt-BR" b="1" dirty="0">
+                <a:solidFill>
+                  <a:srgbClr val="FF0000"/>
+                </a:solidFill>
+                <a:latin typeface="Times New Roman" panose="02020603050405020304" pitchFamily="18" charset="0"/>
+                <a:cs typeface="Times New Roman" panose="02020603050405020304" pitchFamily="18" charset="0"/>
+              </a:rPr>
+              <a:t>Layouts - CSS Grid (Layouts) </a:t>
+            </a:r>
+            <a:r>
+              <a:rPr lang="pt-BR" b="1">
+                <a:solidFill>
+                  <a:srgbClr val="FF0000"/>
+                </a:solidFill>
+                <a:latin typeface="Times New Roman" panose="02020603050405020304" pitchFamily="18" charset="0"/>
+                <a:cs typeface="Times New Roman" panose="02020603050405020304" pitchFamily="18" charset="0"/>
+              </a:rPr>
+              <a:t>- Propriedades</a:t>
+            </a:r>
+            <a:endParaRPr lang="pt-BR" b="1" dirty="0">
+              <a:solidFill>
+                <a:srgbClr val="FF0000"/>
+              </a:solidFill>
+              <a:latin typeface="Times New Roman" panose="02020603050405020304" pitchFamily="18" charset="0"/>
+              <a:cs typeface="Times New Roman" panose="02020603050405020304" pitchFamily="18" charset="0"/>
+            </a:endParaRPr>
+          </a:p>
+          <a:p>
+            <a:pPr marL="0" indent="0" algn="just">
+              <a:buNone/>
+            </a:pPr>
+            <a:r>
+              <a:rPr lang="pt-BR" b="1" dirty="0">
+                <a:solidFill>
+                  <a:schemeClr val="tx1"/>
+                </a:solidFill>
+                <a:latin typeface="Times New Roman" panose="02020603050405020304" pitchFamily="18" charset="0"/>
+                <a:cs typeface="Times New Roman" panose="02020603050405020304" pitchFamily="18" charset="0"/>
+              </a:rPr>
+              <a:t>Container e Item Container</a:t>
+            </a:r>
+          </a:p>
+          <a:p>
+            <a:pPr algn="just">
+              <a:buFontTx/>
+              <a:buChar char="-"/>
+            </a:pPr>
+            <a:r>
+              <a:rPr lang="pt-BR" b="1" dirty="0">
+                <a:solidFill>
+                  <a:srgbClr val="FF0000"/>
+                </a:solidFill>
+                <a:latin typeface="Times New Roman" panose="02020603050405020304" pitchFamily="18" charset="0"/>
+                <a:cs typeface="Times New Roman" panose="02020603050405020304" pitchFamily="18" charset="0"/>
+              </a:rPr>
+              <a:t>Container</a:t>
+            </a:r>
+            <a:r>
+              <a:rPr lang="pt-BR" dirty="0">
+                <a:solidFill>
+                  <a:schemeClr val="tx1"/>
+                </a:solidFill>
+                <a:latin typeface="Times New Roman" panose="02020603050405020304" pitchFamily="18" charset="0"/>
+                <a:cs typeface="Times New Roman" panose="02020603050405020304" pitchFamily="18" charset="0"/>
+              </a:rPr>
+              <a:t>: display: grid; grid-</a:t>
+            </a:r>
+            <a:r>
+              <a:rPr lang="pt-BR" dirty="0" err="1">
+                <a:solidFill>
+                  <a:schemeClr val="tx1"/>
+                </a:solidFill>
+                <a:latin typeface="Times New Roman" panose="02020603050405020304" pitchFamily="18" charset="0"/>
+                <a:cs typeface="Times New Roman" panose="02020603050405020304" pitchFamily="18" charset="0"/>
+              </a:rPr>
+              <a:t>template</a:t>
+            </a:r>
+            <a:r>
+              <a:rPr lang="pt-BR" dirty="0">
+                <a:solidFill>
+                  <a:schemeClr val="tx1"/>
+                </a:solidFill>
+                <a:latin typeface="Times New Roman" panose="02020603050405020304" pitchFamily="18" charset="0"/>
+                <a:cs typeface="Times New Roman" panose="02020603050405020304" pitchFamily="18" charset="0"/>
+              </a:rPr>
+              <a:t>-</a:t>
+            </a:r>
+            <a:r>
+              <a:rPr lang="pt-BR" dirty="0" err="1">
+                <a:solidFill>
+                  <a:schemeClr val="tx1"/>
+                </a:solidFill>
+                <a:latin typeface="Times New Roman" panose="02020603050405020304" pitchFamily="18" charset="0"/>
+                <a:cs typeface="Times New Roman" panose="02020603050405020304" pitchFamily="18" charset="0"/>
+              </a:rPr>
+              <a:t>columns</a:t>
+            </a:r>
+            <a:r>
+              <a:rPr lang="pt-BR" dirty="0">
+                <a:solidFill>
+                  <a:schemeClr val="tx1"/>
+                </a:solidFill>
+                <a:latin typeface="Times New Roman" panose="02020603050405020304" pitchFamily="18" charset="0"/>
+                <a:cs typeface="Times New Roman" panose="02020603050405020304" pitchFamily="18" charset="0"/>
+              </a:rPr>
+              <a:t>; grid-</a:t>
+            </a:r>
+            <a:r>
+              <a:rPr lang="pt-BR" dirty="0" err="1">
+                <a:solidFill>
+                  <a:schemeClr val="tx1"/>
+                </a:solidFill>
+                <a:latin typeface="Times New Roman" panose="02020603050405020304" pitchFamily="18" charset="0"/>
+                <a:cs typeface="Times New Roman" panose="02020603050405020304" pitchFamily="18" charset="0"/>
+              </a:rPr>
+              <a:t>template</a:t>
+            </a:r>
+            <a:r>
+              <a:rPr lang="pt-BR" dirty="0">
+                <a:solidFill>
+                  <a:schemeClr val="tx1"/>
+                </a:solidFill>
+                <a:latin typeface="Times New Roman" panose="02020603050405020304" pitchFamily="18" charset="0"/>
+                <a:cs typeface="Times New Roman" panose="02020603050405020304" pitchFamily="18" charset="0"/>
+              </a:rPr>
+              <a:t>-</a:t>
+            </a:r>
+            <a:r>
+              <a:rPr lang="pt-BR" dirty="0" err="1">
+                <a:solidFill>
+                  <a:schemeClr val="tx1"/>
+                </a:solidFill>
+                <a:latin typeface="Times New Roman" panose="02020603050405020304" pitchFamily="18" charset="0"/>
+                <a:cs typeface="Times New Roman" panose="02020603050405020304" pitchFamily="18" charset="0"/>
+              </a:rPr>
+              <a:t>rows</a:t>
+            </a:r>
+            <a:r>
+              <a:rPr lang="pt-BR" dirty="0">
+                <a:solidFill>
+                  <a:schemeClr val="tx1"/>
+                </a:solidFill>
+                <a:latin typeface="Times New Roman" panose="02020603050405020304" pitchFamily="18" charset="0"/>
+                <a:cs typeface="Times New Roman" panose="02020603050405020304" pitchFamily="18" charset="0"/>
+              </a:rPr>
+              <a:t>; grid-</a:t>
+            </a:r>
+            <a:r>
+              <a:rPr lang="pt-BR" dirty="0" err="1">
+                <a:solidFill>
+                  <a:schemeClr val="tx1"/>
+                </a:solidFill>
+                <a:latin typeface="Times New Roman" panose="02020603050405020304" pitchFamily="18" charset="0"/>
+                <a:cs typeface="Times New Roman" panose="02020603050405020304" pitchFamily="18" charset="0"/>
+              </a:rPr>
+              <a:t>template</a:t>
+            </a:r>
+            <a:r>
+              <a:rPr lang="pt-BR" dirty="0">
+                <a:solidFill>
+                  <a:schemeClr val="tx1"/>
+                </a:solidFill>
+                <a:latin typeface="Times New Roman" panose="02020603050405020304" pitchFamily="18" charset="0"/>
+                <a:cs typeface="Times New Roman" panose="02020603050405020304" pitchFamily="18" charset="0"/>
+              </a:rPr>
+              <a:t>-áreas, etc.</a:t>
+            </a:r>
+          </a:p>
+          <a:p>
+            <a:pPr algn="just">
+              <a:buFontTx/>
+              <a:buChar char="-"/>
+            </a:pPr>
+            <a:endParaRPr lang="pt-BR" dirty="0">
+              <a:solidFill>
+                <a:schemeClr val="tx1"/>
+              </a:solidFill>
+              <a:latin typeface="Times New Roman" panose="02020603050405020304" pitchFamily="18" charset="0"/>
+              <a:cs typeface="Times New Roman" panose="02020603050405020304" pitchFamily="18" charset="0"/>
+            </a:endParaRPr>
+          </a:p>
+          <a:p>
+            <a:pPr algn="just">
+              <a:buFontTx/>
+              <a:buChar char="-"/>
+            </a:pPr>
+            <a:r>
+              <a:rPr lang="pt-BR" b="1" dirty="0">
+                <a:solidFill>
+                  <a:srgbClr val="FF0000"/>
+                </a:solidFill>
+                <a:latin typeface="Times New Roman" panose="02020603050405020304" pitchFamily="18" charset="0"/>
+                <a:cs typeface="Times New Roman" panose="02020603050405020304" pitchFamily="18" charset="0"/>
+              </a:rPr>
+              <a:t>Item Container</a:t>
+            </a:r>
+            <a:r>
+              <a:rPr lang="pt-BR" dirty="0">
+                <a:solidFill>
+                  <a:schemeClr val="tx1"/>
+                </a:solidFill>
+                <a:latin typeface="Times New Roman" panose="02020603050405020304" pitchFamily="18" charset="0"/>
+                <a:cs typeface="Times New Roman" panose="02020603050405020304" pitchFamily="18" charset="0"/>
+              </a:rPr>
+              <a:t>: grid-</a:t>
+            </a:r>
+            <a:r>
+              <a:rPr lang="pt-BR" dirty="0" err="1">
+                <a:solidFill>
+                  <a:schemeClr val="tx1"/>
+                </a:solidFill>
+                <a:latin typeface="Times New Roman" panose="02020603050405020304" pitchFamily="18" charset="0"/>
+                <a:cs typeface="Times New Roman" panose="02020603050405020304" pitchFamily="18" charset="0"/>
+              </a:rPr>
+              <a:t>column</a:t>
+            </a:r>
+            <a:r>
+              <a:rPr lang="pt-BR" dirty="0">
+                <a:solidFill>
+                  <a:schemeClr val="tx1"/>
+                </a:solidFill>
+                <a:latin typeface="Times New Roman" panose="02020603050405020304" pitchFamily="18" charset="0"/>
+                <a:cs typeface="Times New Roman" panose="02020603050405020304" pitchFamily="18" charset="0"/>
+              </a:rPr>
+              <a:t>; grid-</a:t>
+            </a:r>
+            <a:r>
+              <a:rPr lang="pt-BR" dirty="0" err="1">
+                <a:solidFill>
+                  <a:schemeClr val="tx1"/>
+                </a:solidFill>
+                <a:latin typeface="Times New Roman" panose="02020603050405020304" pitchFamily="18" charset="0"/>
+                <a:cs typeface="Times New Roman" panose="02020603050405020304" pitchFamily="18" charset="0"/>
+              </a:rPr>
+              <a:t>column</a:t>
+            </a:r>
+            <a:r>
+              <a:rPr lang="pt-BR" dirty="0">
+                <a:solidFill>
+                  <a:schemeClr val="tx1"/>
+                </a:solidFill>
+                <a:latin typeface="Times New Roman" panose="02020603050405020304" pitchFamily="18" charset="0"/>
+                <a:cs typeface="Times New Roman" panose="02020603050405020304" pitchFamily="18" charset="0"/>
+              </a:rPr>
+              <a:t>-start; grid-</a:t>
+            </a:r>
+            <a:r>
+              <a:rPr lang="pt-BR" dirty="0" err="1">
+                <a:solidFill>
+                  <a:schemeClr val="tx1"/>
+                </a:solidFill>
+                <a:latin typeface="Times New Roman" panose="02020603050405020304" pitchFamily="18" charset="0"/>
+                <a:cs typeface="Times New Roman" panose="02020603050405020304" pitchFamily="18" charset="0"/>
+              </a:rPr>
+              <a:t>column</a:t>
+            </a:r>
+            <a:r>
+              <a:rPr lang="pt-BR" dirty="0">
+                <a:solidFill>
+                  <a:schemeClr val="tx1"/>
+                </a:solidFill>
+                <a:latin typeface="Times New Roman" panose="02020603050405020304" pitchFamily="18" charset="0"/>
+                <a:cs typeface="Times New Roman" panose="02020603050405020304" pitchFamily="18" charset="0"/>
+              </a:rPr>
+              <a:t>-</a:t>
+            </a:r>
+            <a:r>
+              <a:rPr lang="pt-BR" dirty="0" err="1">
+                <a:solidFill>
+                  <a:schemeClr val="tx1"/>
+                </a:solidFill>
+                <a:latin typeface="Times New Roman" panose="02020603050405020304" pitchFamily="18" charset="0"/>
+                <a:cs typeface="Times New Roman" panose="02020603050405020304" pitchFamily="18" charset="0"/>
+              </a:rPr>
+              <a:t>end</a:t>
+            </a:r>
+            <a:r>
+              <a:rPr lang="pt-BR" dirty="0">
+                <a:solidFill>
+                  <a:schemeClr val="tx1"/>
+                </a:solidFill>
+                <a:latin typeface="Times New Roman" panose="02020603050405020304" pitchFamily="18" charset="0"/>
+                <a:cs typeface="Times New Roman" panose="02020603050405020304" pitchFamily="18" charset="0"/>
+              </a:rPr>
+              <a:t>; grid-</a:t>
+            </a:r>
+            <a:r>
+              <a:rPr lang="pt-BR" dirty="0" err="1">
+                <a:solidFill>
+                  <a:schemeClr val="tx1"/>
+                </a:solidFill>
+                <a:latin typeface="Times New Roman" panose="02020603050405020304" pitchFamily="18" charset="0"/>
+                <a:cs typeface="Times New Roman" panose="02020603050405020304" pitchFamily="18" charset="0"/>
+              </a:rPr>
+              <a:t>row</a:t>
+            </a:r>
+            <a:r>
+              <a:rPr lang="pt-BR" dirty="0">
+                <a:solidFill>
+                  <a:schemeClr val="tx1"/>
+                </a:solidFill>
+                <a:latin typeface="Times New Roman" panose="02020603050405020304" pitchFamily="18" charset="0"/>
+                <a:cs typeface="Times New Roman" panose="02020603050405020304" pitchFamily="18" charset="0"/>
+              </a:rPr>
+              <a:t>; grid-área, etc.</a:t>
+            </a:r>
             <a:endParaRPr lang="en-US" dirty="0">
               <a:solidFill>
                 <a:schemeClr val="tx1"/>
@@ -20867,40 +21229,10 @@
           </a:p>
         </p:txBody>
       </p:sp>
-      <p:pic>
-        <p:nvPicPr>
-          <p:cNvPr id="3" name="Imagem 2">
-            <a:extLst>
-              <a:ext uri="{FF2B5EF4-FFF2-40B4-BE49-F238E27FC236}">
-                <a16:creationId xmlns:a16="http://schemas.microsoft.com/office/drawing/2014/main" id="{ADD6F1E6-2E90-47FD-A02D-73764DC5EA8E}"/>
-              </a:ext>
-            </a:extLst>
-          </p:cNvPr>
-          <p:cNvPicPr>
-            <a:picLocks noChangeAspect="1"/>
-          </p:cNvPicPr>
-          <p:nvPr/>
-        </p:nvPicPr>
-        <p:blipFill>
-          <a:blip r:embed="rId3"/>
-          <a:stretch>
-            <a:fillRect/>
-          </a:stretch>
-        </p:blipFill>
-        <p:spPr>
-          <a:xfrm>
-            <a:off x="142865" y="1063230"/>
-            <a:ext cx="6551808" cy="3874289"/>
-          </a:xfrm>
-          <a:prstGeom prst="rect">
-            <a:avLst/>
-          </a:prstGeom>
-        </p:spPr>
-      </p:pic>
     </p:spTree>
     <p:extLst>
       <p:ext uri="{BB962C8B-B14F-4D97-AF65-F5344CB8AC3E}">
-        <p14:creationId xmlns:p14="http://schemas.microsoft.com/office/powerpoint/2010/main" val="42311301"/>
+        <p14:creationId xmlns:p14="http://schemas.microsoft.com/office/powerpoint/2010/main" val="3057936129"/>
       </p:ext>
     </p:extLst>
   </p:cSld>
@@ -21210,228 +21542,6 @@
             <a:pPr marL="0" indent="0" algn="just">
               <a:buNone/>
             </a:pPr>
-            <a:r>
-              <a:rPr lang="pt-BR" dirty="0">
-                <a:solidFill>
-                  <a:schemeClr val="tx1"/>
-                </a:solidFill>
-                <a:latin typeface="Times New Roman" panose="02020603050405020304" pitchFamily="18" charset="0"/>
-                <a:cs typeface="Times New Roman" panose="02020603050405020304" pitchFamily="18" charset="0"/>
-              </a:rPr>
-              <a:t>.</a:t>
-            </a:r>
-            <a:r>
-              <a:rPr lang="pt-BR" b="1" dirty="0">
-                <a:solidFill>
-                  <a:schemeClr val="tx1"/>
-                </a:solidFill>
-                <a:latin typeface="Times New Roman" panose="02020603050405020304" pitchFamily="18" charset="0"/>
-                <a:cs typeface="Times New Roman" panose="02020603050405020304" pitchFamily="18" charset="0"/>
-              </a:rPr>
-              <a:t>grid</a:t>
-            </a:r>
-            <a:r>
-              <a:rPr lang="pt-BR" dirty="0">
-                <a:solidFill>
-                  <a:schemeClr val="tx1"/>
-                </a:solidFill>
-                <a:latin typeface="Times New Roman" panose="02020603050405020304" pitchFamily="18" charset="0"/>
-                <a:cs typeface="Times New Roman" panose="02020603050405020304" pitchFamily="18" charset="0"/>
-              </a:rPr>
-              <a:t> {</a:t>
-            </a:r>
-          </a:p>
-          <a:p>
-            <a:pPr marL="0" indent="0" algn="just">
-              <a:buNone/>
-            </a:pPr>
-            <a:r>
-              <a:rPr lang="pt-BR" dirty="0">
-                <a:solidFill>
-                  <a:schemeClr val="tx1"/>
-                </a:solidFill>
-                <a:latin typeface="Times New Roman" panose="02020603050405020304" pitchFamily="18" charset="0"/>
-                <a:cs typeface="Times New Roman" panose="02020603050405020304" pitchFamily="18" charset="0"/>
-              </a:rPr>
-              <a:t>  </a:t>
-            </a:r>
-            <a:r>
-              <a:rPr lang="pt-BR" b="1" dirty="0">
-                <a:solidFill>
-                  <a:srgbClr val="FF0000"/>
-                </a:solidFill>
-                <a:latin typeface="Times New Roman" panose="02020603050405020304" pitchFamily="18" charset="0"/>
-                <a:cs typeface="Times New Roman" panose="02020603050405020304" pitchFamily="18" charset="0"/>
-              </a:rPr>
-              <a:t>display</a:t>
-            </a:r>
-            <a:r>
-              <a:rPr lang="pt-BR" dirty="0">
-                <a:solidFill>
-                  <a:schemeClr val="tx1"/>
-                </a:solidFill>
-                <a:latin typeface="Times New Roman" panose="02020603050405020304" pitchFamily="18" charset="0"/>
-                <a:cs typeface="Times New Roman" panose="02020603050405020304" pitchFamily="18" charset="0"/>
-              </a:rPr>
-              <a:t>: grid;</a:t>
-            </a:r>
-          </a:p>
-          <a:p>
-            <a:pPr marL="0" indent="0" algn="just">
-              <a:buNone/>
-            </a:pPr>
-            <a:r>
-              <a:rPr lang="pt-BR" b="1" dirty="0">
-                <a:solidFill>
-                  <a:srgbClr val="FF0000"/>
-                </a:solidFill>
-                <a:latin typeface="Times New Roman" panose="02020603050405020304" pitchFamily="18" charset="0"/>
-                <a:cs typeface="Times New Roman" panose="02020603050405020304" pitchFamily="18" charset="0"/>
-              </a:rPr>
-              <a:t>  grid-</a:t>
-            </a:r>
-            <a:r>
-              <a:rPr lang="pt-BR" b="1" dirty="0" err="1">
-                <a:solidFill>
-                  <a:srgbClr val="FF0000"/>
-                </a:solidFill>
-                <a:latin typeface="Times New Roman" panose="02020603050405020304" pitchFamily="18" charset="0"/>
-                <a:cs typeface="Times New Roman" panose="02020603050405020304" pitchFamily="18" charset="0"/>
-              </a:rPr>
-              <a:t>template</a:t>
-            </a:r>
-            <a:r>
-              <a:rPr lang="pt-BR" b="1" dirty="0">
-                <a:solidFill>
-                  <a:srgbClr val="FF0000"/>
-                </a:solidFill>
-                <a:latin typeface="Times New Roman" panose="02020603050405020304" pitchFamily="18" charset="0"/>
-                <a:cs typeface="Times New Roman" panose="02020603050405020304" pitchFamily="18" charset="0"/>
-              </a:rPr>
-              <a:t>-</a:t>
-            </a:r>
-            <a:r>
-              <a:rPr lang="pt-BR" b="1" dirty="0" err="1">
-                <a:solidFill>
-                  <a:srgbClr val="FF0000"/>
-                </a:solidFill>
-                <a:latin typeface="Times New Roman" panose="02020603050405020304" pitchFamily="18" charset="0"/>
-                <a:cs typeface="Times New Roman" panose="02020603050405020304" pitchFamily="18" charset="0"/>
-              </a:rPr>
-              <a:t>columns</a:t>
-            </a:r>
-            <a:r>
-              <a:rPr lang="pt-BR" dirty="0">
-                <a:solidFill>
-                  <a:schemeClr val="tx1"/>
-                </a:solidFill>
-                <a:latin typeface="Times New Roman" panose="02020603050405020304" pitchFamily="18" charset="0"/>
-                <a:cs typeface="Times New Roman" panose="02020603050405020304" pitchFamily="18" charset="0"/>
-              </a:rPr>
-              <a:t>: </a:t>
-            </a:r>
-            <a:r>
-              <a:rPr lang="pt-BR" dirty="0" err="1">
-                <a:solidFill>
-                  <a:schemeClr val="tx1"/>
-                </a:solidFill>
-                <a:latin typeface="Times New Roman" panose="02020603050405020304" pitchFamily="18" charset="0"/>
-                <a:cs typeface="Times New Roman" panose="02020603050405020304" pitchFamily="18" charset="0"/>
-              </a:rPr>
-              <a:t>repeat</a:t>
-            </a:r>
-            <a:r>
-              <a:rPr lang="pt-BR" dirty="0">
-                <a:solidFill>
-                  <a:schemeClr val="tx1"/>
-                </a:solidFill>
-                <a:latin typeface="Times New Roman" panose="02020603050405020304" pitchFamily="18" charset="0"/>
-                <a:cs typeface="Times New Roman" panose="02020603050405020304" pitchFamily="18" charset="0"/>
-              </a:rPr>
-              <a:t>(3, 1fr);</a:t>
-            </a:r>
-          </a:p>
-          <a:p>
-            <a:pPr marL="0" indent="0" algn="just">
-              <a:buNone/>
-            </a:pPr>
-            <a:r>
-              <a:rPr lang="pt-BR" dirty="0">
-                <a:solidFill>
-                  <a:schemeClr val="tx1"/>
-                </a:solidFill>
-                <a:latin typeface="Times New Roman" panose="02020603050405020304" pitchFamily="18" charset="0"/>
-                <a:cs typeface="Times New Roman" panose="02020603050405020304" pitchFamily="18" charset="0"/>
-              </a:rPr>
-              <a:t>}</a:t>
-            </a:r>
-          </a:p>
-          <a:p>
-            <a:pPr marL="0" indent="0" algn="just">
-              <a:buNone/>
-            </a:pPr>
-            <a:endParaRPr lang="pt-BR" dirty="0">
-              <a:solidFill>
-                <a:schemeClr val="tx1"/>
-              </a:solidFill>
-              <a:latin typeface="Times New Roman" panose="02020603050405020304" pitchFamily="18" charset="0"/>
-              <a:cs typeface="Times New Roman" panose="02020603050405020304" pitchFamily="18" charset="0"/>
-            </a:endParaRPr>
-          </a:p>
-          <a:p>
-            <a:pPr marL="0" indent="0" algn="just">
-              <a:buNone/>
-            </a:pPr>
-            <a:r>
-              <a:rPr lang="en-US" b="1" dirty="0">
-                <a:solidFill>
-                  <a:schemeClr val="tx1"/>
-                </a:solidFill>
-                <a:latin typeface="Times New Roman" panose="02020603050405020304" pitchFamily="18" charset="0"/>
-                <a:cs typeface="Times New Roman" panose="02020603050405020304" pitchFamily="18" charset="0"/>
-              </a:rPr>
-              <a:t>Nota</a:t>
-            </a:r>
-            <a:r>
-              <a:rPr lang="en-US" dirty="0">
-                <a:solidFill>
-                  <a:schemeClr val="tx1"/>
-                </a:solidFill>
-                <a:latin typeface="Times New Roman" panose="02020603050405020304" pitchFamily="18" charset="0"/>
-                <a:cs typeface="Times New Roman" panose="02020603050405020304" pitchFamily="18" charset="0"/>
-              </a:rPr>
-              <a:t>: </a:t>
-            </a:r>
-            <a:r>
-              <a:rPr lang="pt-BR" dirty="0">
-                <a:solidFill>
-                  <a:schemeClr val="tx1"/>
-                </a:solidFill>
-                <a:latin typeface="Times New Roman" panose="02020603050405020304" pitchFamily="18" charset="0"/>
-                <a:cs typeface="Times New Roman" panose="02020603050405020304" pitchFamily="18" charset="0"/>
-              </a:rPr>
-              <a:t>Com </a:t>
-            </a:r>
-            <a:r>
-              <a:rPr lang="pt-BR" b="1" dirty="0">
-                <a:solidFill>
-                  <a:schemeClr val="tx1"/>
-                </a:solidFill>
-                <a:latin typeface="Times New Roman" panose="02020603050405020304" pitchFamily="18" charset="0"/>
-                <a:cs typeface="Times New Roman" panose="02020603050405020304" pitchFamily="18" charset="0"/>
-              </a:rPr>
-              <a:t>CSS Grid</a:t>
-            </a:r>
-            <a:r>
-              <a:rPr lang="pt-BR" dirty="0">
-                <a:solidFill>
-                  <a:schemeClr val="tx1"/>
-                </a:solidFill>
-                <a:latin typeface="Times New Roman" panose="02020603050405020304" pitchFamily="18" charset="0"/>
-                <a:cs typeface="Times New Roman" panose="02020603050405020304" pitchFamily="18" charset="0"/>
-              </a:rPr>
-              <a:t> a gente consegue grids responsivos sem media queries</a:t>
-            </a:r>
             <a:endParaRPr lang="en-US" dirty="0">
               <a:solidFill>
                 <a:schemeClr val="tx1"/>
@@ -21442,10 +21552,40 @@
           </a:p>
         </p:txBody>
       </p:sp>
+      <p:pic>
+        <p:nvPicPr>
+          <p:cNvPr id="3" name="Imagem 2">
+            <a:extLst>
+              <a:ext uri="{FF2B5EF4-FFF2-40B4-BE49-F238E27FC236}">
+                <a16:creationId xmlns:a16="http://schemas.microsoft.com/office/drawing/2014/main" id="{ADD6F1E6-2E90-47FD-A02D-73764DC5EA8E}"/>
+              </a:ext>
+            </a:extLst>
+          </p:cNvPr>
+          <p:cNvPicPr>
+            <a:picLocks noChangeAspect="1"/>
+          </p:cNvPicPr>
+          <p:nvPr/>
+        </p:nvPicPr>
+        <p:blipFill>
+          <a:blip r:embed="rId3"/>
+          <a:stretch>
+            <a:fillRect/>
+          </a:stretch>
+        </p:blipFill>
+        <p:spPr>
+          <a:xfrm>
+            <a:off x="142865" y="1063230"/>
+            <a:ext cx="6551808" cy="3874289"/>
+          </a:xfrm>
+          <a:prstGeom prst="rect">
+            <a:avLst/>
+          </a:prstGeom>
+        </p:spPr>
+      </p:pic>
     </p:spTree>
     <p:extLst>
       <p:ext uri="{BB962C8B-B14F-4D97-AF65-F5344CB8AC3E}">
-        <p14:creationId xmlns:p14="http://schemas.microsoft.com/office/powerpoint/2010/main" val="4233812734"/>
+        <p14:creationId xmlns:p14="http://schemas.microsoft.com/office/powerpoint/2010/main" val="42311301"/>
       </p:ext>
     </p:extLst>
   </p:cSld>
@@ -21574,7 +21714,7 @@
                 <a:latin typeface="Times New Roman" panose="02020603050405020304" pitchFamily="18" charset="0"/>
                 <a:cs typeface="Times New Roman" panose="02020603050405020304" pitchFamily="18" charset="0"/>
               </a:rPr>
-              <a:t> </a:t>
+              <a:t>  </a:t>
             </a:r>
             <a:r>
               <a:rPr lang="pt-BR" b="1" dirty="0">
@@ -21584,7 +21724,7 @@
                 <a:latin typeface="Times New Roman" panose="02020603050405020304" pitchFamily="18" charset="0"/>
                 <a:cs typeface="Times New Roman" panose="02020603050405020304" pitchFamily="18" charset="0"/>
               </a:rPr>
-              <a:t> display</a:t>
+              <a:t>display</a:t>
             </a:r>
             <a:r>
               <a:rPr lang="pt-BR" dirty="0">
@@ -21669,18 +21809,13 @@
                 <a:latin typeface="Times New Roman" panose="02020603050405020304" pitchFamily="18" charset="0"/>
                 <a:cs typeface="Times New Roman" panose="02020603050405020304" pitchFamily="18" charset="0"/>
               </a:rPr>
-              <a:t>(</a:t>
-            </a:r>
-            <a:r>
-              <a:rPr lang="pt-BR" dirty="0" err="1">
-                <a:solidFill>
-                  <a:schemeClr val="tx1"/>
-                </a:solidFill>
-                <a:latin typeface="Times New Roman" panose="02020603050405020304" pitchFamily="18" charset="0"/>
-                <a:cs typeface="Times New Roman" panose="02020603050405020304" pitchFamily="18" charset="0"/>
-              </a:rPr>
-              <a:t>auto-fit</a:t>
-            </a:r>
+              <a:t>(3, 1fr);</a:t>
+            </a:r>
+          </a:p>
+          <a:p>
+            <a:pPr marL="0" indent="0" algn="just">
+              <a:buNone/>
+            </a:pPr>
             <a:r>
               <a:rPr lang="pt-BR" dirty="0">
                 <a:solidFill>
@@ -21689,17 +21824,44 @@
                 <a:latin typeface="Times New Roman" panose="02020603050405020304" pitchFamily="18" charset="0"/>
                 <a:cs typeface="Times New Roman" panose="02020603050405020304" pitchFamily="18" charset="0"/>
               </a:rPr>
-              <a:t>, </a:t>
-            </a:r>
-            <a:r>
-              <a:rPr lang="pt-BR" dirty="0" err="1">
-                <a:solidFill>
-                  <a:schemeClr val="tx1"/>
-                </a:solidFill>
-                <a:latin typeface="Times New Roman" panose="02020603050405020304" pitchFamily="18" charset="0"/>
-                <a:cs typeface="Times New Roman" panose="02020603050405020304" pitchFamily="18" charset="0"/>
-              </a:rPr>
-              <a:t>minmax</a:t>
+              <a:t>}</a:t>
+            </a:r>
+          </a:p>
+          <a:p>
+            <a:pPr marL="0" indent="0" algn="just">
+              <a:buNone/>
+            </a:pPr>
+            <a:endParaRPr lang="pt-BR" dirty="0">
+              <a:solidFill>
+                <a:schemeClr val="tx1"/>
+              </a:solidFill>
+              <a:latin typeface="Times New Roman" panose="02020603050405020304" pitchFamily="18" charset="0"/>
+              <a:cs typeface="Times New Roman" panose="02020603050405020304" pitchFamily="18" charset="0"/>
+            </a:endParaRPr>
+          </a:p>
+          <a:p>
+            <a:pPr marL="0" indent="0" algn="just">
+              <a:buNone/>
+            </a:pPr>
+            <a:r>
+              <a:rPr lang="en-US" b="1" dirty="0">
+                <a:solidFill>
+                  <a:schemeClr val="tx1"/>
+                </a:solidFill>
+                <a:latin typeface="Times New Roman" panose="02020603050405020304" pitchFamily="18" charset="0"/>
+                <a:cs typeface="Times New Roman" panose="02020603050405020304" pitchFamily="18" charset="0"/>
+              </a:rPr>
+              <a:t>Nota</a:t>
+            </a:r>
+            <a:r>
+              <a:rPr lang="en-US" dirty="0">
+                <a:solidFill>
+                  <a:schemeClr val="tx1"/>
+                </a:solidFill>
+                <a:latin typeface="Times New Roman" panose="02020603050405020304" pitchFamily="18" charset="0"/>
+                <a:cs typeface="Times New Roman" panose="02020603050405020304" pitchFamily="18" charset="0"/>
+              </a:rPr>
+              <a:t>: </a:t>
             </a:r>
             <a:r>
               <a:rPr lang="pt-BR" dirty="0">
@@ -21709,13 +21871,18 @@
                 <a:latin typeface="Times New Roman" panose="02020603050405020304" pitchFamily="18" charset="0"/>
                 <a:cs typeface="Times New Roman" panose="02020603050405020304" pitchFamily="18" charset="0"/>
               </a:rPr>
-              <a:t>(250px, 1fr));</a:t>
-            </a:r>
-          </a:p>
-          <a:p>
-            <a:pPr marL="0" indent="0" algn="just">
-              <a:buNone/>
-            </a:pPr>
+              <a:t>Com </a:t>
+            </a:r>
+            <a:r>
+              <a:rPr lang="pt-BR" b="1" dirty="0">
+                <a:solidFill>
+                  <a:schemeClr val="tx1"/>
+                </a:solidFill>
+                <a:latin typeface="Times New Roman" panose="02020603050405020304" pitchFamily="18" charset="0"/>
+                <a:cs typeface="Times New Roman" panose="02020603050405020304" pitchFamily="18" charset="0"/>
+              </a:rPr>
+              <a:t>CSS Grid</a:t>
+            </a:r>
             <a:r>
               <a:rPr lang="pt-BR" dirty="0">
                 <a:solidFill>
@@ -21724,7 +21891,7 @@
                 <a:latin typeface="Times New Roman" panose="02020603050405020304" pitchFamily="18" charset="0"/>
                 <a:cs typeface="Times New Roman" panose="02020603050405020304" pitchFamily="18" charset="0"/>
               </a:rPr>
-              <a:t>}</a:t>
+              <a:t> a gente consegue grids responsivos sem media queries</a:t>
             </a:r>
             <a:endParaRPr lang="en-US" dirty="0">
               <a:solidFill>
@@ -21739,7 +21906,7 @@
     </p:spTree>
     <p:extLst>
       <p:ext uri="{BB962C8B-B14F-4D97-AF65-F5344CB8AC3E}">
-        <p14:creationId xmlns:p14="http://schemas.microsoft.com/office/powerpoint/2010/main" val="2599599402"/>
+        <p14:creationId xmlns:p14="http://schemas.microsoft.com/office/powerpoint/2010/main" val="4233812734"/>
       </p:ext>
     </p:extLst>
   </p:cSld>
@@ -21833,7 +22000,7 @@
                 <a:latin typeface="Times New Roman" panose="02020603050405020304" pitchFamily="18" charset="0"/>
                 <a:cs typeface="Times New Roman" panose="02020603050405020304" pitchFamily="18" charset="0"/>
               </a:rPr>
-              <a:t>Se a gente quiser, por exemplo, que o </a:t>
+              <a:t>.</a:t>
             </a:r>
             <a:r>
               <a:rPr lang="pt-BR" b="1" dirty="0">
@@ -21843,7 +22010,7 @@
                 <a:latin typeface="Times New Roman" panose="02020603050405020304" pitchFamily="18" charset="0"/>
                 <a:cs typeface="Times New Roman" panose="02020603050405020304" pitchFamily="18" charset="0"/>
               </a:rPr>
-              <a:t>grid tenha 3 colunas </a:t>
+              <a:t>grid</a:t>
             </a:r>
             <a:r>
               <a:rPr lang="pt-BR" dirty="0">
@@ -21853,7 +22020,22 @@
                 <a:latin typeface="Times New Roman" panose="02020603050405020304" pitchFamily="18" charset="0"/>
                 <a:cs typeface="Times New Roman" panose="02020603050405020304" pitchFamily="18" charset="0"/>
               </a:rPr>
-              <a:t>no </a:t>
+              <a:t> {</a:t>
+            </a:r>
+          </a:p>
+          <a:p>
+            <a:pPr marL="0" indent="0" algn="just">
+              <a:buNone/>
+            </a:pPr>
+            <a:r>
+              <a:rPr lang="pt-BR" dirty="0">
+                <a:solidFill>
+                  <a:schemeClr val="tx1"/>
+                </a:solidFill>
+                <a:latin typeface="Times New Roman" panose="02020603050405020304" pitchFamily="18" charset="0"/>
+                <a:cs typeface="Times New Roman" panose="02020603050405020304" pitchFamily="18" charset="0"/>
+              </a:rPr>
+              <a:t> </a:t>
             </a:r>
             <a:r>
               <a:rPr lang="pt-BR" b="1" dirty="0">
@@ -21863,7 +22045,7 @@
                 <a:latin typeface="Times New Roman" panose="02020603050405020304" pitchFamily="18" charset="0"/>
                 <a:cs typeface="Times New Roman" panose="02020603050405020304" pitchFamily="18" charset="0"/>
               </a:rPr>
-              <a:t>Desktop, 2 colunas em Tablets e 1 coluna no Mobile</a:t>
+              <a:t> display</a:t>
             </a:r>
             <a:r>
               <a:rPr lang="pt-BR" dirty="0">
@@ -21873,31 +22055,106 @@
                 <a:latin typeface="Times New Roman" panose="02020603050405020304" pitchFamily="18" charset="0"/>
                 <a:cs typeface="Times New Roman" panose="02020603050405020304" pitchFamily="18" charset="0"/>
               </a:rPr>
-              <a:t>, de acordo com o número de elementos que cabe na tela, é só adicionar </a:t>
+              <a:t>: grid;</a:t>
+            </a:r>
+          </a:p>
+          <a:p>
+            <a:pPr marL="0" indent="0" algn="just">
+              <a:buNone/>
+            </a:pPr>
+            <a:r>
+              <a:rPr lang="pt-BR" b="1" dirty="0">
+                <a:solidFill>
+                  <a:srgbClr val="FF0000"/>
+                </a:solidFill>
+                <a:latin typeface="Times New Roman" panose="02020603050405020304" pitchFamily="18" charset="0"/>
+                <a:cs typeface="Times New Roman" panose="02020603050405020304" pitchFamily="18" charset="0"/>
+              </a:rPr>
+              <a:t>  grid-</a:t>
             </a:r>
             <a:r>
               <a:rPr lang="pt-BR" b="1" dirty="0" err="1">
                 <a:solidFill>
-                  <a:schemeClr val="tx1"/>
-                </a:solidFill>
-                <a:latin typeface="Times New Roman" panose="02020603050405020304" pitchFamily="18" charset="0"/>
-                <a:cs typeface="Times New Roman" panose="02020603050405020304" pitchFamily="18" charset="0"/>
-              </a:rPr>
-              <a:t>autofit</a:t>
+                  <a:srgbClr val="FF0000"/>
+                </a:solidFill>
+                <a:latin typeface="Times New Roman" panose="02020603050405020304" pitchFamily="18" charset="0"/>
+                <a:cs typeface="Times New Roman" panose="02020603050405020304" pitchFamily="18" charset="0"/>
+              </a:rPr>
+              <a:t>template</a:t>
             </a:r>
             <a:r>
               <a:rPr lang="pt-BR" b="1" dirty="0">
                 <a:solidFill>
-                  <a:schemeClr val="tx1"/>
-                </a:solidFill>
-                <a:latin typeface="Times New Roman" panose="02020603050405020304" pitchFamily="18" charset="0"/>
-                <a:cs typeface="Times New Roman" panose="02020603050405020304" pitchFamily="18" charset="0"/>
-              </a:rPr>
-              <a:t> junto </a:t>
+                  <a:srgbClr val="FF0000"/>
+                </a:solidFill>
+                <a:latin typeface="Times New Roman" panose="02020603050405020304" pitchFamily="18" charset="0"/>
+                <a:cs typeface="Times New Roman" panose="02020603050405020304" pitchFamily="18" charset="0"/>
+              </a:rPr>
+              <a:t>-</a:t>
             </a:r>
             <a:r>
               <a:rPr lang="pt-BR" b="1" dirty="0" err="1">
                 <a:solidFill>
+                  <a:srgbClr val="FF0000"/>
+                </a:solidFill>
+                <a:latin typeface="Times New Roman" panose="02020603050405020304" pitchFamily="18" charset="0"/>
+                <a:cs typeface="Times New Roman" panose="02020603050405020304" pitchFamily="18" charset="0"/>
+              </a:rPr>
+              <a:t>columns</a:t>
+            </a:r>
+            <a:r>
+              <a:rPr lang="pt-BR" dirty="0">
+                <a:solidFill>
+                  <a:schemeClr val="tx1"/>
+                </a:solidFill>
+                <a:latin typeface="Times New Roman" panose="02020603050405020304" pitchFamily="18" charset="0"/>
+                <a:cs typeface="Times New Roman" panose="02020603050405020304" pitchFamily="18" charset="0"/>
+              </a:rPr>
+              <a:t>: </a:t>
+            </a:r>
+            <a:r>
+              <a:rPr lang="pt-BR" dirty="0" err="1">
+                <a:solidFill>
+                  <a:schemeClr val="tx1"/>
+                </a:solidFill>
+                <a:latin typeface="Times New Roman" panose="02020603050405020304" pitchFamily="18" charset="0"/>
+                <a:cs typeface="Times New Roman" panose="02020603050405020304" pitchFamily="18" charset="0"/>
+              </a:rPr>
+              <a:t>repeat</a:t>
+            </a:r>
+            <a:r>
+              <a:rPr lang="pt-BR" dirty="0">
+                <a:solidFill>
+                  <a:schemeClr val="tx1"/>
+                </a:solidFill>
+                <a:latin typeface="Times New Roman" panose="02020603050405020304" pitchFamily="18" charset="0"/>
+                <a:cs typeface="Times New Roman" panose="02020603050405020304" pitchFamily="18" charset="0"/>
+              </a:rPr>
+              <a:t>(</a:t>
+            </a:r>
+            <a:r>
+              <a:rPr lang="pt-BR" dirty="0" err="1">
+                <a:solidFill>
+                  <a:schemeClr val="tx1"/>
+                </a:solidFill>
+                <a:latin typeface="Times New Roman" panose="02020603050405020304" pitchFamily="18" charset="0"/>
+                <a:cs typeface="Times New Roman" panose="02020603050405020304" pitchFamily="18" charset="0"/>
+              </a:rPr>
+              <a:t>auto-fit</a:t>
+            </a:r>
+            <a:r>
+              <a:rPr lang="pt-BR" dirty="0">
+                <a:solidFill>
+                  <a:schemeClr val="tx1"/>
+                </a:solidFill>
+                <a:latin typeface="Times New Roman" panose="02020603050405020304" pitchFamily="18" charset="0"/>
+                <a:cs typeface="Times New Roman" panose="02020603050405020304" pitchFamily="18" charset="0"/>
+              </a:rPr>
+              <a:t>, </a:t>
+            </a:r>
+            <a:r>
+              <a:rPr lang="pt-BR" dirty="0" err="1">
+                <a:solidFill>
                   <a:schemeClr val="tx1"/>
                 </a:solidFill>
                 <a:latin typeface="Times New Roman" panose="02020603050405020304" pitchFamily="18" charset="0"/>
@@ -21913,35 +22170,13 @@
                 <a:latin typeface="Times New Roman" panose="02020603050405020304" pitchFamily="18" charset="0"/>
                 <a:cs typeface="Times New Roman" panose="02020603050405020304" pitchFamily="18" charset="0"/>
               </a:rPr>
-              <a:t>.</a:t>
+              <a:t>(250px, 1fr));</a:t>
             </a:r>
           </a:p>
           <a:p>
             <a:pPr marL="0" indent="0" algn="just">
               <a:buNone/>
             </a:pPr>
-            <a:endParaRPr lang="pt-BR" dirty="0">
-              <a:solidFill>
-                <a:schemeClr val="tx1"/>
-              </a:solidFill>
-              <a:latin typeface="Times New Roman" panose="02020603050405020304" pitchFamily="18" charset="0"/>
-              <a:cs typeface="Times New Roman" panose="02020603050405020304" pitchFamily="18" charset="0"/>
-            </a:endParaRPr>
-          </a:p>
-          <a:p>
-            <a:pPr marL="0" indent="0" algn="just">
-              <a:buNone/>
-            </a:pPr>
-            <a:r>
-              <a:rPr lang="pt-BR" b="1" dirty="0">
-                <a:solidFill>
-                  <a:srgbClr val="FF0000"/>
-                </a:solidFill>
-                <a:latin typeface="Times New Roman" panose="02020603050405020304" pitchFamily="18" charset="0"/>
-                <a:cs typeface="Times New Roman" panose="02020603050405020304" pitchFamily="18" charset="0"/>
-              </a:rPr>
-              <a:t>250px</a:t>
-            </a:r>
             <a:r>
               <a:rPr lang="pt-BR" dirty="0">
                 <a:solidFill>
@@ -21950,27 +22185,7 @@
                 <a:latin typeface="Times New Roman" panose="02020603050405020304" pitchFamily="18" charset="0"/>
                 <a:cs typeface="Times New Roman" panose="02020603050405020304" pitchFamily="18" charset="0"/>
               </a:rPr>
-              <a:t> é o tamanho mínimo das colunas na tela e </a:t>
-            </a:r>
-            <a:r>
-              <a:rPr lang="pt-BR" b="1" dirty="0">
-                <a:solidFill>
-                  <a:srgbClr val="FF0000"/>
-                </a:solidFill>
-                <a:latin typeface="Times New Roman" panose="02020603050405020304" pitchFamily="18" charset="0"/>
-                <a:cs typeface="Times New Roman" panose="02020603050405020304" pitchFamily="18" charset="0"/>
-              </a:rPr>
-              <a:t>1fr</a:t>
-            </a:r>
-            <a:r>
-              <a:rPr lang="pt-BR" dirty="0">
-                <a:solidFill>
-                  <a:schemeClr val="tx1"/>
-                </a:solidFill>
-                <a:latin typeface="Times New Roman" panose="02020603050405020304" pitchFamily="18" charset="0"/>
-                <a:cs typeface="Times New Roman" panose="02020603050405020304" pitchFamily="18" charset="0"/>
-              </a:rPr>
-              <a:t> representa uma fração do espaço disponível no grid.</a:t>
+              <a:t>}</a:t>
             </a:r>
             <a:endParaRPr lang="en-US" dirty="0">
               <a:solidFill>
@@ -21985,7 +22200,7 @@
     </p:spTree>
     <p:extLst>
       <p:ext uri="{BB962C8B-B14F-4D97-AF65-F5344CB8AC3E}">
-        <p14:creationId xmlns:p14="http://schemas.microsoft.com/office/powerpoint/2010/main" val="1007987059"/>
+        <p14:creationId xmlns:p14="http://schemas.microsoft.com/office/powerpoint/2010/main" val="2599599402"/>
       </p:ext>
     </p:extLst>
   </p:cSld>
@@ -22079,7 +22294,7 @@
                 <a:latin typeface="Times New Roman" panose="02020603050405020304" pitchFamily="18" charset="0"/>
                 <a:cs typeface="Times New Roman" panose="02020603050405020304" pitchFamily="18" charset="0"/>
               </a:rPr>
-              <a:t>Tanto </a:t>
+              <a:t>Se a gente quiser, por exemplo, que o </a:t>
             </a:r>
             <a:r>
               <a:rPr lang="pt-BR" b="1" dirty="0">
@@ -22089,7 +22304,7 @@
                 <a:latin typeface="Times New Roman" panose="02020603050405020304" pitchFamily="18" charset="0"/>
                 <a:cs typeface="Times New Roman" panose="02020603050405020304" pitchFamily="18" charset="0"/>
               </a:rPr>
-              <a:t>CSS Grid</a:t>
+              <a:t>grid tenha 3 colunas </a:t>
             </a:r>
             <a:r>
               <a:rPr lang="pt-BR" dirty="0">
@@ -22099,7 +22314,27 @@
                 <a:latin typeface="Times New Roman" panose="02020603050405020304" pitchFamily="18" charset="0"/>
                 <a:cs typeface="Times New Roman" panose="02020603050405020304" pitchFamily="18" charset="0"/>
               </a:rPr>
-              <a:t> quanto </a:t>
+              <a:t>no </a:t>
+            </a:r>
+            <a:r>
+              <a:rPr lang="pt-BR" b="1" dirty="0">
+                <a:solidFill>
+                  <a:srgbClr val="FF0000"/>
+                </a:solidFill>
+                <a:latin typeface="Times New Roman" panose="02020603050405020304" pitchFamily="18" charset="0"/>
+                <a:cs typeface="Times New Roman" panose="02020603050405020304" pitchFamily="18" charset="0"/>
+              </a:rPr>
+              <a:t>Desktop, 2 colunas em Tablets e 1 coluna no Mobile</a:t>
+            </a:r>
+            <a:r>
+              <a:rPr lang="pt-BR" dirty="0">
+                <a:solidFill>
+                  <a:schemeClr val="tx1"/>
+                </a:solidFill>
+                <a:latin typeface="Times New Roman" panose="02020603050405020304" pitchFamily="18" charset="0"/>
+                <a:cs typeface="Times New Roman" panose="02020603050405020304" pitchFamily="18" charset="0"/>
+              </a:rPr>
+              <a:t>, de acordo com o número de elementos que cabe na tela, é só adicionar </a:t>
             </a:r>
             <a:r>
               <a:rPr lang="pt-BR" b="1" dirty="0" err="1">
@@ -22109,7 +22344,27 @@
                 <a:latin typeface="Times New Roman" panose="02020603050405020304" pitchFamily="18" charset="0"/>
                 <a:cs typeface="Times New Roman" panose="02020603050405020304" pitchFamily="18" charset="0"/>
               </a:rPr>
-              <a:t>Flexbox</a:t>
+              <a:t>autofit</a:t>
+            </a:r>
+            <a:r>
+              <a:rPr lang="pt-BR" b="1" dirty="0">
+                <a:solidFill>
+                  <a:schemeClr val="tx1"/>
+                </a:solidFill>
+                <a:latin typeface="Times New Roman" panose="02020603050405020304" pitchFamily="18" charset="0"/>
+                <a:cs typeface="Times New Roman" panose="02020603050405020304" pitchFamily="18" charset="0"/>
+              </a:rPr>
+              <a:t> junto </a:t>
+            </a:r>
+            <a:r>
+              <a:rPr lang="pt-BR" b="1" dirty="0" err="1">
+                <a:solidFill>
+                  <a:schemeClr val="tx1"/>
+                </a:solidFill>
+                <a:latin typeface="Times New Roman" panose="02020603050405020304" pitchFamily="18" charset="0"/>
+                <a:cs typeface="Times New Roman" panose="02020603050405020304" pitchFamily="18" charset="0"/>
+              </a:rPr>
+              <a:t>minmax</a:t>
             </a:r>
             <a:r>
               <a:rPr lang="pt-BR" dirty="0">
@@ -22119,7 +22374,7 @@
                 <a:latin typeface="Times New Roman" panose="02020603050405020304" pitchFamily="18" charset="0"/>
                 <a:cs typeface="Times New Roman" panose="02020603050405020304" pitchFamily="18" charset="0"/>
               </a:rPr>
-              <a:t> apresentam suporte completo em todos os navegadores modernos e suporte parcial desde o IE10!</a:t>
+              <a:t>.</a:t>
             </a:r>
           </a:p>
           <a:p>
@@ -22139,6 +22394,16 @@
               <a:buNone/>
             </a:pPr>
             <a:r>
+              <a:rPr lang="pt-BR" b="1" dirty="0">
+                <a:solidFill>
+                  <a:srgbClr val="FF0000"/>
+                </a:solidFill>
+                <a:latin typeface="Times New Roman" panose="02020603050405020304" pitchFamily="18" charset="0"/>
+                <a:cs typeface="Times New Roman" panose="02020603050405020304" pitchFamily="18" charset="0"/>
+              </a:rPr>
+              <a:t>250px</a:t>
+            </a:r>
+            <a:r>
               <a:rPr lang="pt-BR" dirty="0">
                 <a:solidFill>
                   <a:schemeClr val="tx1"/>
@@ -22146,17 +22411,17 @@
                 <a:latin typeface="Times New Roman" panose="02020603050405020304" pitchFamily="18" charset="0"/>
                 <a:cs typeface="Times New Roman" panose="02020603050405020304" pitchFamily="18" charset="0"/>
               </a:rPr>
-              <a:t>Nos últimos anos o </a:t>
+              <a:t> é o tamanho mínimo das colunas na tela e </a:t>
             </a:r>
             <a:r>
               <a:rPr lang="pt-BR" b="1" dirty="0">
                 <a:solidFill>
-                  <a:schemeClr val="tx1"/>
-                </a:solidFill>
-                <a:latin typeface="Times New Roman" panose="02020603050405020304" pitchFamily="18" charset="0"/>
-                <a:cs typeface="Times New Roman" panose="02020603050405020304" pitchFamily="18" charset="0"/>
-              </a:rPr>
-              <a:t>CSS</a:t>
+                  <a:srgbClr val="FF0000"/>
+                </a:solidFill>
+                <a:latin typeface="Times New Roman" panose="02020603050405020304" pitchFamily="18" charset="0"/>
+                <a:cs typeface="Times New Roman" panose="02020603050405020304" pitchFamily="18" charset="0"/>
+              </a:rPr>
+              <a:t>1fr</a:t>
             </a:r>
             <a:r>
               <a:rPr lang="pt-BR" dirty="0">
@@ -22166,34 +22431,9 @@
                 <a:latin typeface="Times New Roman" panose="02020603050405020304" pitchFamily="18" charset="0"/>
                 <a:cs typeface="Times New Roman" panose="02020603050405020304" pitchFamily="18" charset="0"/>
               </a:rPr>
-              <a:t> ganhou várias </a:t>
-            </a:r>
-            <a:r>
-              <a:rPr lang="pt-BR" b="1" dirty="0" err="1">
-                <a:solidFill>
-                  <a:schemeClr val="tx1"/>
-                </a:solidFill>
-                <a:latin typeface="Times New Roman" panose="02020603050405020304" pitchFamily="18" charset="0"/>
-                <a:cs typeface="Times New Roman" panose="02020603050405020304" pitchFamily="18" charset="0"/>
-              </a:rPr>
-              <a:t>features</a:t>
-            </a:r>
-            <a:r>
-              <a:rPr lang="pt-BR" dirty="0">
-                <a:solidFill>
-                  <a:schemeClr val="tx1"/>
-                </a:solidFill>
-                <a:latin typeface="Times New Roman" panose="02020603050405020304" pitchFamily="18" charset="0"/>
-                <a:cs typeface="Times New Roman" panose="02020603050405020304" pitchFamily="18" charset="0"/>
-              </a:rPr>
-              <a:t> interessantes e que facilitam demais nosso dia a dia.</a:t>
-            </a:r>
-          </a:p>
-          <a:p>
-            <a:pPr marL="0" indent="0" algn="just">
-              <a:buNone/>
-            </a:pPr>
-            <a:endParaRPr lang="pt-BR" dirty="0">
+              <a:t> representa uma fração do espaço disponível no grid.</a:t>
+            </a:r>
+            <a:endParaRPr lang="en-US" dirty="0">
               <a:solidFill>
                 <a:schemeClr val="tx1"/>
               </a:solidFill>
@@ -22201,68 +22441,12 @@
               <a:cs typeface="Times New Roman" panose="02020603050405020304" pitchFamily="18" charset="0"/>
             </a:endParaRPr>
           </a:p>
-          <a:p>
-            <a:pPr marL="0" indent="0" algn="just">
-              <a:buNone/>
-            </a:pPr>
-            <a:r>
-              <a:rPr lang="pt-BR" dirty="0">
-                <a:solidFill>
-                  <a:schemeClr val="tx1"/>
-                </a:solidFill>
-                <a:latin typeface="Times New Roman" panose="02020603050405020304" pitchFamily="18" charset="0"/>
-                <a:cs typeface="Times New Roman" panose="02020603050405020304" pitchFamily="18" charset="0"/>
-              </a:rPr>
-              <a:t>Veja: </a:t>
-            </a:r>
-            <a:r>
-              <a:rPr lang="pt-BR" sz="2400" dirty="0">
-                <a:solidFill>
-                  <a:schemeClr val="tx1"/>
-                </a:solidFill>
-                <a:latin typeface="Times New Roman" panose="02020603050405020304" pitchFamily="18" charset="0"/>
-                <a:cs typeface="Times New Roman" panose="02020603050405020304" pitchFamily="18" charset="0"/>
-                <a:hlinkClick r:id="rId3"/>
-              </a:rPr>
-              <a:t>https://www.treinaweb.com.br/blog</a:t>
-            </a:r>
-            <a:r>
-              <a:rPr lang="pt-BR" sz="2400">
-                <a:solidFill>
-                  <a:schemeClr val="tx1"/>
-                </a:solidFill>
-                <a:latin typeface="Times New Roman" panose="02020603050405020304" pitchFamily="18" charset="0"/>
-                <a:cs typeface="Times New Roman" panose="02020603050405020304" pitchFamily="18" charset="0"/>
-                <a:hlinkClick r:id="rId3"/>
-              </a:rPr>
-              <a:t>/flexbox-ou-css-grid</a:t>
-            </a:r>
-            <a:endParaRPr lang="pt-BR" sz="2400">
-              <a:solidFill>
-                <a:schemeClr val="tx1"/>
-              </a:solidFill>
-              <a:latin typeface="Times New Roman" panose="02020603050405020304" pitchFamily="18" charset="0"/>
-              <a:cs typeface="Times New Roman" panose="02020603050405020304" pitchFamily="18" charset="0"/>
-            </a:endParaRPr>
-          </a:p>
-          <a:p>
-            <a:pPr marL="0" indent="0" algn="just">
-              <a:buNone/>
-            </a:pPr>
-            <a:endParaRPr lang="en-US" sz="2400" dirty="0">
-              <a:solidFill>
-                <a:schemeClr val="tx1"/>
-              </a:solidFill>
-              <a:latin typeface="Times New Roman" panose="02020603050405020304" pitchFamily="18" charset="0"/>
-              <a:cs typeface="Times New Roman" panose="02020603050405020304" pitchFamily="18" charset="0"/>
-            </a:endParaRPr>
-          </a:p>
         </p:txBody>
       </p:sp>
     </p:spTree>
     <p:extLst>
       <p:ext uri="{BB962C8B-B14F-4D97-AF65-F5344CB8AC3E}">
-        <p14:creationId xmlns:p14="http://schemas.microsoft.com/office/powerpoint/2010/main" val="1406879547"/>
+        <p14:creationId xmlns:p14="http://schemas.microsoft.com/office/powerpoint/2010/main" val="1007987059"/>
       </p:ext>
     </p:extLst>
   </p:cSld>
@@ -22313,34 +22497,13 @@
           <a:lstStyle/>
           <a:p>
             <a:r>
-              <a:rPr lang="en-US" b="1" dirty="0" err="1">
+              <a:rPr lang="en-US" b="1" dirty="0">
                 <a:solidFill>
                   <a:srgbClr val="0070C0"/>
                 </a:solidFill>
               </a:rPr>
-              <a:t>Leitura</a:t>
-            </a:r>
-            <a:r>
-              <a:rPr lang="en-US" b="1" dirty="0">
-                <a:solidFill>
-                  <a:srgbClr val="0070C0"/>
-                </a:solidFill>
-              </a:rPr>
-              <a:t> </a:t>
-            </a:r>
-            <a:r>
-              <a:rPr lang="en-US" b="1" dirty="0" err="1">
-                <a:solidFill>
-                  <a:srgbClr val="0070C0"/>
-                </a:solidFill>
-              </a:rPr>
-              <a:t>Específica</a:t>
-            </a:r>
-            <a:endParaRPr lang="en-US" b="1" dirty="0">
-              <a:solidFill>
-                <a:srgbClr val="0070C0"/>
-              </a:solidFill>
-            </a:endParaRPr>
+              <a:t>CSS – Flexbox vs Grid Layout</a:t>
+            </a:r>
           </a:p>
         </p:txBody>
       </p:sp>
@@ -22356,8 +22519,8 @@
         </p:nvSpPr>
         <p:spPr>
           <a:xfrm>
-            <a:off x="142865" y="1012261"/>
-            <a:ext cx="8865056" cy="3835312"/>
+            <a:off x="142865" y="1037312"/>
+            <a:ext cx="8865056" cy="4023203"/>
           </a:xfrm>
         </p:spPr>
         <p:txBody>
@@ -22370,61 +22533,64 @@
               <a:buNone/>
             </a:pPr>
             <a:r>
-              <a:rPr lang="pt-BR" sz="2000" dirty="0">
-                <a:latin typeface="Times New Roman" panose="02020603050405020304" pitchFamily="18" charset="0"/>
-                <a:cs typeface="Times New Roman" panose="02020603050405020304" pitchFamily="18" charset="0"/>
-              </a:rPr>
-              <a:t>[1] </a:t>
-            </a:r>
-            <a:r>
-              <a:rPr lang="pt-BR" sz="2000" b="1" dirty="0">
-                <a:latin typeface="Times New Roman" panose="02020603050405020304" pitchFamily="18" charset="0"/>
-                <a:cs typeface="Times New Roman" panose="02020603050405020304" pitchFamily="18" charset="0"/>
-              </a:rPr>
-              <a:t>Site CSS</a:t>
-            </a:r>
-            <a:r>
-              <a:rPr lang="pt-BR" sz="2000" dirty="0">
-                <a:latin typeface="Times New Roman" panose="02020603050405020304" pitchFamily="18" charset="0"/>
-                <a:cs typeface="Times New Roman" panose="02020603050405020304" pitchFamily="18" charset="0"/>
-              </a:rPr>
-              <a:t>.</a:t>
+              <a:rPr lang="pt-BR" dirty="0">
+                <a:solidFill>
+                  <a:schemeClr val="tx1"/>
+                </a:solidFill>
+                <a:latin typeface="Times New Roman" panose="02020603050405020304" pitchFamily="18" charset="0"/>
+                <a:cs typeface="Times New Roman" panose="02020603050405020304" pitchFamily="18" charset="0"/>
+              </a:rPr>
+              <a:t>Tanto </a:t>
+            </a:r>
+            <a:r>
+              <a:rPr lang="pt-BR" b="1" dirty="0">
+                <a:solidFill>
+                  <a:schemeClr val="tx1"/>
+                </a:solidFill>
+                <a:latin typeface="Times New Roman" panose="02020603050405020304" pitchFamily="18" charset="0"/>
+                <a:cs typeface="Times New Roman" panose="02020603050405020304" pitchFamily="18" charset="0"/>
+              </a:rPr>
+              <a:t>CSS Grid</a:t>
+            </a:r>
+            <a:r>
+              <a:rPr lang="pt-BR" dirty="0">
+                <a:solidFill>
+                  <a:schemeClr val="tx1"/>
+                </a:solidFill>
+                <a:latin typeface="Times New Roman" panose="02020603050405020304" pitchFamily="18" charset="0"/>
+                <a:cs typeface="Times New Roman" panose="02020603050405020304" pitchFamily="18" charset="0"/>
+              </a:rPr>
+              <a:t> quanto </a:t>
+            </a:r>
+            <a:r>
+              <a:rPr lang="pt-BR" b="1" dirty="0" err="1">
+                <a:solidFill>
+                  <a:schemeClr val="tx1"/>
+                </a:solidFill>
+                <a:latin typeface="Times New Roman" panose="02020603050405020304" pitchFamily="18" charset="0"/>
+                <a:cs typeface="Times New Roman" panose="02020603050405020304" pitchFamily="18" charset="0"/>
+              </a:rPr>
+              <a:t>Flexbox</a:t>
+            </a:r>
+            <a:r>
+              <a:rPr lang="pt-BR" dirty="0">
+                <a:solidFill>
+                  <a:schemeClr val="tx1"/>
+                </a:solidFill>
+                <a:latin typeface="Times New Roman" panose="02020603050405020304" pitchFamily="18" charset="0"/>
+                <a:cs typeface="Times New Roman" panose="02020603050405020304" pitchFamily="18" charset="0"/>
+              </a:rPr>
+              <a:t> apresentam suporte completo em todos os navegadores modernos e suporte parcial desde o IE10!</a:t>
             </a:r>
           </a:p>
           <a:p>
             <a:pPr marL="0" indent="0" algn="just">
               <a:buNone/>
             </a:pPr>
-            <a:r>
-              <a:rPr lang="pt-BR" sz="2000" dirty="0">
-                <a:latin typeface="Times New Roman" panose="02020603050405020304" pitchFamily="18" charset="0"/>
-                <a:cs typeface="Times New Roman" panose="02020603050405020304" pitchFamily="18" charset="0"/>
-              </a:rPr>
-              <a:t>	</a:t>
-            </a:r>
-            <a:r>
-              <a:rPr lang="pt-BR" sz="2000" b="1" dirty="0">
-                <a:latin typeface="Times New Roman" panose="02020603050405020304" pitchFamily="18" charset="0"/>
-                <a:cs typeface="Times New Roman" panose="02020603050405020304" pitchFamily="18" charset="0"/>
-              </a:rPr>
-              <a:t>Disponível em</a:t>
-            </a:r>
-            <a:r>
-              <a:rPr lang="pt-BR" sz="2000" dirty="0">
-                <a:latin typeface="Times New Roman" panose="02020603050405020304" pitchFamily="18" charset="0"/>
-                <a:cs typeface="Times New Roman" panose="02020603050405020304" pitchFamily="18" charset="0"/>
-              </a:rPr>
-              <a:t>: </a:t>
-            </a:r>
-            <a:r>
-              <a:rPr lang="pt-BR" sz="2000" dirty="0">
-                <a:latin typeface="Times New Roman" panose="02020603050405020304" pitchFamily="18" charset="0"/>
-                <a:cs typeface="Times New Roman" panose="02020603050405020304" pitchFamily="18" charset="0"/>
-                <a:hlinkClick r:id="rId3"/>
-              </a:rPr>
-              <a:t>https://velhobit.com.br/design/3-dicas-rapidas-de-css-para-facilitar-leitura-de-conteudo-do-seu-site-ou-blog.html</a:t>
-            </a:r>
-            <a:endParaRPr lang="pt-BR" sz="2000" dirty="0">
+            <a:endParaRPr lang="pt-BR" dirty="0">
+              <a:solidFill>
+                <a:schemeClr val="tx1"/>
+              </a:solidFill>
               <a:latin typeface="Times New Roman" panose="02020603050405020304" pitchFamily="18" charset="0"/>
               <a:cs typeface="Times New Roman" panose="02020603050405020304" pitchFamily="18" charset="0"/>
             </a:endParaRPr>
@@ -22433,7 +22599,65 @@
             <a:pPr marL="0" indent="0" algn="just">
               <a:buNone/>
             </a:pPr>
-            <a:endParaRPr lang="pt-BR" sz="2000" dirty="0">
+            <a:r>
+              <a:rPr lang="pt-BR" dirty="0">
+                <a:solidFill>
+                  <a:schemeClr val="tx1"/>
+                </a:solidFill>
+                <a:latin typeface="Times New Roman" panose="02020603050405020304" pitchFamily="18" charset="0"/>
+                <a:cs typeface="Times New Roman" panose="02020603050405020304" pitchFamily="18" charset="0"/>
+              </a:rPr>
+              <a:t>Nos últimos anos o </a:t>
+            </a:r>
+            <a:r>
+              <a:rPr lang="pt-BR" b="1" dirty="0">
+                <a:solidFill>
+                  <a:schemeClr val="tx1"/>
+                </a:solidFill>
+                <a:latin typeface="Times New Roman" panose="02020603050405020304" pitchFamily="18" charset="0"/>
+                <a:cs typeface="Times New Roman" panose="02020603050405020304" pitchFamily="18" charset="0"/>
+              </a:rPr>
+              <a:t>CSS</a:t>
+            </a:r>
+            <a:r>
+              <a:rPr lang="pt-BR" dirty="0">
+                <a:solidFill>
+                  <a:schemeClr val="tx1"/>
+                </a:solidFill>
+                <a:latin typeface="Times New Roman" panose="02020603050405020304" pitchFamily="18" charset="0"/>
+                <a:cs typeface="Times New Roman" panose="02020603050405020304" pitchFamily="18" charset="0"/>
+              </a:rPr>
+              <a:t> ganhou várias </a:t>
+            </a:r>
+            <a:r>
+              <a:rPr lang="pt-BR" b="1" dirty="0" err="1">
+                <a:solidFill>
+                  <a:schemeClr val="tx1"/>
+                </a:solidFill>
+                <a:latin typeface="Times New Roman" panose="02020603050405020304" pitchFamily="18" charset="0"/>
+                <a:cs typeface="Times New Roman" panose="02020603050405020304" pitchFamily="18" charset="0"/>
+              </a:rPr>
+              <a:t>features</a:t>
+            </a:r>
+            <a:r>
+              <a:rPr lang="pt-BR" dirty="0">
+                <a:solidFill>
+                  <a:schemeClr val="tx1"/>
+                </a:solidFill>
+                <a:latin typeface="Times New Roman" panose="02020603050405020304" pitchFamily="18" charset="0"/>
+                <a:cs typeface="Times New Roman" panose="02020603050405020304" pitchFamily="18" charset="0"/>
+              </a:rPr>
+              <a:t> interessantes e que facilitam demais nosso dia a dia.</a:t>
+            </a:r>
+          </a:p>
+          <a:p>
+            <a:pPr marL="0" indent="0" algn="just">
+              <a:buNone/>
+            </a:pPr>
+            <a:endParaRPr lang="pt-BR" dirty="0">
+              <a:solidFill>
+                <a:schemeClr val="tx1"/>
+              </a:solidFill>
               <a:latin typeface="Times New Roman" panose="02020603050405020304" pitchFamily="18" charset="0"/>
               <a:cs typeface="Times New Roman" panose="02020603050405020304" pitchFamily="18" charset="0"/>
             </a:endParaRPr>
@@ -22443,74 +22667,41 @@
               <a:buNone/>
             </a:pPr>
             <a:r>
-              <a:rPr lang="pt-BR" sz="2000" dirty="0">
-                <a:latin typeface="Times New Roman" panose="02020603050405020304" pitchFamily="18" charset="0"/>
-                <a:cs typeface="Times New Roman" panose="02020603050405020304" pitchFamily="18" charset="0"/>
-              </a:rPr>
-              <a:t>[2] </a:t>
-            </a:r>
-            <a:r>
-              <a:rPr lang="pt-BR" sz="2000" b="1" dirty="0">
-                <a:latin typeface="Times New Roman" panose="02020603050405020304" pitchFamily="18" charset="0"/>
-                <a:cs typeface="Times New Roman" panose="02020603050405020304" pitchFamily="18" charset="0"/>
-              </a:rPr>
-              <a:t>SCHEIDT, </a:t>
-            </a:r>
-            <a:r>
-              <a:rPr lang="pt-BR" sz="2000" dirty="0" err="1">
-                <a:latin typeface="Times New Roman" panose="02020603050405020304" pitchFamily="18" charset="0"/>
-                <a:cs typeface="Times New Roman" panose="02020603050405020304" pitchFamily="18" charset="0"/>
-              </a:rPr>
-              <a:t>Felippe</a:t>
-            </a:r>
-            <a:r>
-              <a:rPr lang="pt-BR" sz="2000" dirty="0">
-                <a:latin typeface="Times New Roman" panose="02020603050405020304" pitchFamily="18" charset="0"/>
-                <a:cs typeface="Times New Roman" panose="02020603050405020304" pitchFamily="18" charset="0"/>
-              </a:rPr>
-              <a:t> Alex. Fundamentos de CSS: criando design para sistemas web. </a:t>
-            </a:r>
-            <a:r>
-              <a:rPr lang="pt-BR" sz="2000" dirty="0" err="1">
-                <a:latin typeface="Times New Roman" panose="02020603050405020304" pitchFamily="18" charset="0"/>
-                <a:cs typeface="Times New Roman" panose="02020603050405020304" pitchFamily="18" charset="0"/>
-              </a:rPr>
-              <a:t>Outbox</a:t>
-            </a:r>
-            <a:r>
-              <a:rPr lang="pt-BR" sz="2000" dirty="0">
-                <a:latin typeface="Times New Roman" panose="02020603050405020304" pitchFamily="18" charset="0"/>
-                <a:cs typeface="Times New Roman" panose="02020603050405020304" pitchFamily="18" charset="0"/>
-              </a:rPr>
-              <a:t> Livros Digitais, 2015.</a:t>
-            </a:r>
-          </a:p>
-          <a:p>
-            <a:pPr marL="0" indent="0" algn="just">
-              <a:buNone/>
-            </a:pPr>
-            <a:r>
-              <a:rPr lang="pt-BR" sz="2000" dirty="0">
-                <a:latin typeface="Times New Roman" panose="02020603050405020304" pitchFamily="18" charset="0"/>
-                <a:cs typeface="Times New Roman" panose="02020603050405020304" pitchFamily="18" charset="0"/>
-              </a:rPr>
-              <a:t>	</a:t>
-            </a:r>
-            <a:r>
-              <a:rPr lang="pt-BR" sz="2000" b="1" dirty="0">
-                <a:latin typeface="Times New Roman" panose="02020603050405020304" pitchFamily="18" charset="0"/>
-                <a:cs typeface="Times New Roman" panose="02020603050405020304" pitchFamily="18" charset="0"/>
-              </a:rPr>
-              <a:t>Disponível em</a:t>
-            </a:r>
-            <a:r>
-              <a:rPr lang="pt-BR" sz="2000" dirty="0">
-                <a:latin typeface="Times New Roman" panose="02020603050405020304" pitchFamily="18" charset="0"/>
-                <a:cs typeface="Times New Roman" panose="02020603050405020304" pitchFamily="18" charset="0"/>
-              </a:rPr>
-              <a:t>:</a:t>
-            </a:r>
-            <a:endParaRPr lang="pt-BR" sz="2000" b="1" dirty="0">
+              <a:rPr lang="pt-BR" dirty="0">
+                <a:solidFill>
+                  <a:schemeClr val="tx1"/>
+                </a:solidFill>
+                <a:latin typeface="Times New Roman" panose="02020603050405020304" pitchFamily="18" charset="0"/>
+                <a:cs typeface="Times New Roman" panose="02020603050405020304" pitchFamily="18" charset="0"/>
+              </a:rPr>
+              <a:t>Veja: </a:t>
+            </a:r>
+            <a:r>
+              <a:rPr lang="pt-BR" sz="2400" dirty="0">
+                <a:solidFill>
+                  <a:schemeClr val="tx1"/>
+                </a:solidFill>
+                <a:latin typeface="Times New Roman" panose="02020603050405020304" pitchFamily="18" charset="0"/>
+                <a:cs typeface="Times New Roman" panose="02020603050405020304" pitchFamily="18" charset="0"/>
+                <a:hlinkClick r:id="rId3"/>
+              </a:rPr>
+              <a:t>https://www.treinaweb.com.br/blog</a:t>
+            </a:r>
+            <a:r>
+              <a:rPr lang="pt-BR" sz="2400">
+                <a:solidFill>
+                  <a:schemeClr val="tx1"/>
+                </a:solidFill>
+                <a:latin typeface="Times New Roman" panose="02020603050405020304" pitchFamily="18" charset="0"/>
+                <a:cs typeface="Times New Roman" panose="02020603050405020304" pitchFamily="18" charset="0"/>
+                <a:hlinkClick r:id="rId3"/>
+              </a:rPr>
+              <a:t>/flexbox-ou-css-grid</a:t>
+            </a:r>
+            <a:endParaRPr lang="pt-BR" sz="2400">
+              <a:solidFill>
+                <a:schemeClr val="tx1"/>
+              </a:solidFill>
               <a:latin typeface="Times New Roman" panose="02020603050405020304" pitchFamily="18" charset="0"/>
               <a:cs typeface="Times New Roman" panose="02020603050405020304" pitchFamily="18" charset="0"/>
             </a:endParaRPr>
@@ -22519,15 +22710,10 @@
             <a:pPr marL="0" indent="0" algn="just">
               <a:buNone/>
             </a:pPr>
-            <a:r>
-              <a:rPr lang="pt-BR" sz="2000" dirty="0">
-                <a:latin typeface="Times New Roman" panose="02020603050405020304" pitchFamily="18" charset="0"/>
-                <a:cs typeface="Times New Roman" panose="02020603050405020304" pitchFamily="18" charset="0"/>
-                <a:hlinkClick r:id="rId4"/>
-              </a:rPr>
-              <a:t>https://books.google.com.br/books?hl=pt-BR&amp;lr=&amp;id=04cbCgAAQBAJ&amp;oi=fnd&amp;pg=PT5&amp;dq=Estiliza%C3%A7%C3%A3o+CSS+HTML&amp;ots=JttwDQX0Za&amp;sig=hDatOrM6nS37uFMOHLHtxBcaNeA#v=onepage&amp;q=Estiliza%C3%A7%C3%A3o%20CSS%20HTML&amp;f=false</a:t>
-            </a:r>
-            <a:endParaRPr lang="pt-BR" sz="2000" dirty="0">
+            <a:endParaRPr lang="en-US" sz="2400" dirty="0">
+              <a:solidFill>
+                <a:schemeClr val="tx1"/>
+              </a:solidFill>
               <a:latin typeface="Times New Roman" panose="02020603050405020304" pitchFamily="18" charset="0"/>
               <a:cs typeface="Times New Roman" panose="02020603050405020304" pitchFamily="18" charset="0"/>
             </a:endParaRPr>
@@ -22537,7 +22723,7 @@
     </p:spTree>
     <p:extLst>
       <p:ext uri="{BB962C8B-B14F-4D97-AF65-F5344CB8AC3E}">
-        <p14:creationId xmlns:p14="http://schemas.microsoft.com/office/powerpoint/2010/main" val="3680270425"/>
+        <p14:creationId xmlns:p14="http://schemas.microsoft.com/office/powerpoint/2010/main" val="1406879547"/>
       </p:ext>
     </p:extLst>
   </p:cSld>
@@ -22593,7 +22779,7 @@
                   <a:srgbClr val="0070C0"/>
                 </a:solidFill>
               </a:rPr>
-              <a:t>Aprenda</a:t>
+              <a:t>Leitura</a:t>
             </a:r>
             <a:r>
               <a:rPr lang="en-US" b="1" dirty="0">
@@ -22601,8 +22787,21 @@
                   <a:srgbClr val="0070C0"/>
                 </a:solidFill>
               </a:rPr>
-              <a:t>+</a:t>
-            </a:r>
+              <a:t> </a:t>
+            </a:r>
+            <a:r>
+              <a:rPr lang="en-US" b="1" dirty="0" err="1">
+                <a:solidFill>
+                  <a:srgbClr val="0070C0"/>
+                </a:solidFill>
+              </a:rPr>
+              <a:t>Específica</a:t>
+            </a:r>
+            <a:endParaRPr lang="en-US" b="1" dirty="0">
+              <a:solidFill>
+                <a:srgbClr val="0070C0"/>
+              </a:solidFill>
+            </a:endParaRPr>
           </a:p>
         </p:txBody>
       </p:sp>
@@ -22618,8 +22817,8 @@
         </p:nvSpPr>
         <p:spPr>
           <a:xfrm>
-            <a:off x="142865" y="1024786"/>
-            <a:ext cx="8865056" cy="3912733"/>
+            <a:off x="142865" y="1012261"/>
+            <a:ext cx="8865056" cy="3835312"/>
           </a:xfrm>
         </p:spPr>
         <p:txBody>
@@ -22632,33 +22831,61 @@
               <a:buNone/>
             </a:pPr>
             <a:r>
-              <a:rPr lang="pt-BR" sz="2400" dirty="0">
+              <a:rPr lang="pt-BR" sz="2000" dirty="0">
                 <a:latin typeface="Times New Roman" panose="02020603050405020304" pitchFamily="18" charset="0"/>
                 <a:cs typeface="Times New Roman" panose="02020603050405020304" pitchFamily="18" charset="0"/>
               </a:rPr>
               <a:t>[1] </a:t>
             </a:r>
             <a:r>
-              <a:rPr lang="pt-BR" sz="2400" dirty="0">
+              <a:rPr lang="pt-BR" sz="2000" b="1" dirty="0">
+                <a:latin typeface="Times New Roman" panose="02020603050405020304" pitchFamily="18" charset="0"/>
+                <a:cs typeface="Times New Roman" panose="02020603050405020304" pitchFamily="18" charset="0"/>
+              </a:rPr>
+              <a:t>Site CSS</a:t>
+            </a:r>
+            <a:r>
+              <a:rPr lang="pt-BR" sz="2000" dirty="0">
+                <a:latin typeface="Times New Roman" panose="02020603050405020304" pitchFamily="18" charset="0"/>
+                <a:cs typeface="Times New Roman" panose="02020603050405020304" pitchFamily="18" charset="0"/>
+              </a:rPr>
+              <a:t>.</a:t>
+            </a:r>
+          </a:p>
+          <a:p>
+            <a:pPr marL="0" indent="0" algn="just">
+              <a:buNone/>
+            </a:pPr>
+            <a:r>
+              <a:rPr lang="pt-BR" sz="2000" dirty="0">
+                <a:latin typeface="Times New Roman" panose="02020603050405020304" pitchFamily="18" charset="0"/>
+                <a:cs typeface="Times New Roman" panose="02020603050405020304" pitchFamily="18" charset="0"/>
+              </a:rPr>
+              <a:t>	</a:t>
+            </a:r>
+            <a:r>
+              <a:rPr lang="pt-BR" sz="2000" b="1" dirty="0">
+                <a:latin typeface="Times New Roman" panose="02020603050405020304" pitchFamily="18" charset="0"/>
+                <a:cs typeface="Times New Roman" panose="02020603050405020304" pitchFamily="18" charset="0"/>
+              </a:rPr>
+              <a:t>Disponível em</a:t>
+            </a:r>
+            <a:r>
+              <a:rPr lang="pt-BR" sz="2000" dirty="0">
+                <a:latin typeface="Times New Roman" panose="02020603050405020304" pitchFamily="18" charset="0"/>
+                <a:cs typeface="Times New Roman" panose="02020603050405020304" pitchFamily="18" charset="0"/>
+              </a:rPr>
+              <a:t>: </a:t>
+            </a:r>
+            <a:r>
+              <a:rPr lang="pt-BR" sz="2000" dirty="0">
                 <a:latin typeface="Times New Roman" panose="02020603050405020304" pitchFamily="18" charset="0"/>
                 <a:cs typeface="Times New Roman" panose="02020603050405020304" pitchFamily="18" charset="0"/>
                 <a:hlinkClick r:id="rId3"/>
               </a:rPr>
-              <a:t>https://www.youtube.com/watch?v=ieTHC78giGQ</a:t>
-            </a:r>
-            <a:r>
-              <a:rPr lang="pt-BR" sz="2400" dirty="0">
-                <a:latin typeface="Times New Roman" panose="02020603050405020304" pitchFamily="18" charset="0"/>
-                <a:cs typeface="Times New Roman" panose="02020603050405020304" pitchFamily="18" charset="0"/>
-              </a:rPr>
-              <a:t>  (CSS)</a:t>
-            </a:r>
-          </a:p>
-          <a:p>
-            <a:pPr marL="0" indent="0" algn="just">
-              <a:buNone/>
-            </a:pPr>
-            <a:endParaRPr lang="pt-BR" sz="2400" dirty="0">
+              <a:t>https://velhobit.com.br/design/3-dicas-rapidas-de-css-para-facilitar-leitura-de-conteudo-do-seu-site-ou-blog.html</a:t>
+            </a:r>
+            <a:endParaRPr lang="pt-BR" sz="2000" dirty="0">
               <a:latin typeface="Times New Roman" panose="02020603050405020304" pitchFamily="18" charset="0"/>
               <a:cs typeface="Times New Roman" panose="02020603050405020304" pitchFamily="18" charset="0"/>
             </a:endParaRPr>
@@ -22667,7 +22894,7 @@
             <a:pPr marL="0" indent="0" algn="just">
               <a:buNone/>
             </a:pPr>
-            <a:endParaRPr lang="pt-BR" sz="2400" dirty="0">
+            <a:endParaRPr lang="pt-BR" sz="2000" dirty="0">
               <a:latin typeface="Times New Roman" panose="02020603050405020304" pitchFamily="18" charset="0"/>
               <a:cs typeface="Times New Roman" panose="02020603050405020304" pitchFamily="18" charset="0"/>
             </a:endParaRPr>
@@ -22677,33 +22904,74 @@
               <a:buNone/>
             </a:pPr>
             <a:r>
-              <a:rPr lang="pt-BR" sz="2400" dirty="0">
+              <a:rPr lang="pt-BR" sz="2000" dirty="0">
                 <a:latin typeface="Times New Roman" panose="02020603050405020304" pitchFamily="18" charset="0"/>
                 <a:cs typeface="Times New Roman" panose="02020603050405020304" pitchFamily="18" charset="0"/>
               </a:rPr>
               <a:t>[2] </a:t>
             </a:r>
             <a:r>
-              <a:rPr lang="pt-BR" sz="2400" dirty="0">
-                <a:latin typeface="Times New Roman" panose="02020603050405020304" pitchFamily="18" charset="0"/>
-                <a:cs typeface="Times New Roman" panose="02020603050405020304" pitchFamily="18" charset="0"/>
-                <a:hlinkClick r:id="rId4"/>
-              </a:rPr>
-              <a:t>https://www.youtube.com/watch?v=Tfjd5yzCaxk</a:t>
-            </a:r>
-            <a:r>
-              <a:rPr lang="pt-BR" sz="2400" dirty="0">
-                <a:latin typeface="Times New Roman" panose="02020603050405020304" pitchFamily="18" charset="0"/>
-                <a:cs typeface="Times New Roman" panose="02020603050405020304" pitchFamily="18" charset="0"/>
-              </a:rPr>
-              <a:t> (CSS)</a:t>
+              <a:rPr lang="pt-BR" sz="2000" b="1" dirty="0">
+                <a:latin typeface="Times New Roman" panose="02020603050405020304" pitchFamily="18" charset="0"/>
+                <a:cs typeface="Times New Roman" panose="02020603050405020304" pitchFamily="18" charset="0"/>
+              </a:rPr>
+              <a:t>SCHEIDT, </a:t>
+            </a:r>
+            <a:r>
+              <a:rPr lang="pt-BR" sz="2000" dirty="0" err="1">
+                <a:latin typeface="Times New Roman" panose="02020603050405020304" pitchFamily="18" charset="0"/>
+                <a:cs typeface="Times New Roman" panose="02020603050405020304" pitchFamily="18" charset="0"/>
+              </a:rPr>
+              <a:t>Felippe</a:t>
+            </a:r>
+            <a:r>
+              <a:rPr lang="pt-BR" sz="2000" dirty="0">
+                <a:latin typeface="Times New Roman" panose="02020603050405020304" pitchFamily="18" charset="0"/>
+                <a:cs typeface="Times New Roman" panose="02020603050405020304" pitchFamily="18" charset="0"/>
+              </a:rPr>
+              <a:t> Alex. Fundamentos de CSS: criando design para sistemas web. </a:t>
+            </a:r>
+            <a:r>
+              <a:rPr lang="pt-BR" sz="2000" dirty="0" err="1">
+                <a:latin typeface="Times New Roman" panose="02020603050405020304" pitchFamily="18" charset="0"/>
+                <a:cs typeface="Times New Roman" panose="02020603050405020304" pitchFamily="18" charset="0"/>
+              </a:rPr>
+              <a:t>Outbox</a:t>
+            </a:r>
+            <a:r>
+              <a:rPr lang="pt-BR" sz="2000" dirty="0">
+                <a:latin typeface="Times New Roman" panose="02020603050405020304" pitchFamily="18" charset="0"/>
+                <a:cs typeface="Times New Roman" panose="02020603050405020304" pitchFamily="18" charset="0"/>
+              </a:rPr>
+              <a:t> Livros Digitais, 2015.</a:t>
             </a:r>
           </a:p>
           <a:p>
             <a:pPr marL="0" indent="0" algn="just">
               <a:buNone/>
             </a:pPr>
-            <a:endParaRPr lang="pt-BR" sz="2400" dirty="0">
+            <a:r>
+              <a:rPr lang="pt-BR" sz="2000" dirty="0">
+                <a:latin typeface="Times New Roman" panose="02020603050405020304" pitchFamily="18" charset="0"/>
+                <a:cs typeface="Times New Roman" panose="02020603050405020304" pitchFamily="18" charset="0"/>
+              </a:rPr>
+              <a:t>	</a:t>
+            </a:r>
+            <a:r>
+              <a:rPr lang="pt-BR" sz="2000" b="1" dirty="0">
+                <a:latin typeface="Times New Roman" panose="02020603050405020304" pitchFamily="18" charset="0"/>
+                <a:cs typeface="Times New Roman" panose="02020603050405020304" pitchFamily="18" charset="0"/>
+              </a:rPr>
+              <a:t>Disponível em</a:t>
+            </a:r>
+            <a:r>
+              <a:rPr lang="pt-BR" sz="2000" dirty="0">
+                <a:latin typeface="Times New Roman" panose="02020603050405020304" pitchFamily="18" charset="0"/>
+                <a:cs typeface="Times New Roman" panose="02020603050405020304" pitchFamily="18" charset="0"/>
+              </a:rPr>
+              <a:t>:</a:t>
+            </a:r>
+            <a:endParaRPr lang="pt-BR" sz="2000" b="1" dirty="0">
               <a:latin typeface="Times New Roman" panose="02020603050405020304" pitchFamily="18" charset="0"/>
               <a:cs typeface="Times New Roman" panose="02020603050405020304" pitchFamily="18" charset="0"/>
             </a:endParaRPr>
@@ -22713,44 +22981,14 @@
               <a:buNone/>
             </a:pPr>
             <a:r>
-              <a:rPr lang="pt-BR" sz="2400" dirty="0">
-                <a:latin typeface="Times New Roman" panose="02020603050405020304" pitchFamily="18" charset="0"/>
-                <a:cs typeface="Times New Roman" panose="02020603050405020304" pitchFamily="18" charset="0"/>
-              </a:rPr>
-              <a:t>[3]Exemplos de Box Model</a:t>
-            </a:r>
-          </a:p>
-          <a:p>
-            <a:pPr marL="0" indent="0" algn="just">
-              <a:buNone/>
-            </a:pPr>
-            <a:r>
-              <a:rPr lang="pt-BR" sz="2400" dirty="0">
-                <a:latin typeface="Times New Roman" panose="02020603050405020304" pitchFamily="18" charset="0"/>
-                <a:cs typeface="Times New Roman" panose="02020603050405020304" pitchFamily="18" charset="0"/>
-                <a:hlinkClick r:id="rId5"/>
-              </a:rPr>
-              <a:t>https://www.google.com.br/search?q=css+box+model&amp;num=100&amp;source=lnms&amp;tbm=isch&amp;sa=X&amp;ved=0ahUKEwioi_HwxZPYAhWJIZAKHTRVCYAQ_AUICigB&amp;biw=1366&amp;bih=677</a:t>
-            </a:r>
-            <a:endParaRPr lang="pt-BR" sz="2400" dirty="0">
-              <a:latin typeface="Times New Roman" panose="02020603050405020304" pitchFamily="18" charset="0"/>
-              <a:cs typeface="Times New Roman" panose="02020603050405020304" pitchFamily="18" charset="0"/>
-            </a:endParaRPr>
-          </a:p>
-          <a:p>
-            <a:pPr marL="0" indent="0" algn="just">
-              <a:buNone/>
-            </a:pPr>
-            <a:endParaRPr lang="pt-BR" sz="2400" dirty="0">
-              <a:latin typeface="Times New Roman" panose="02020603050405020304" pitchFamily="18" charset="0"/>
-              <a:cs typeface="Times New Roman" panose="02020603050405020304" pitchFamily="18" charset="0"/>
-            </a:endParaRPr>
-          </a:p>
-          <a:p>
-            <a:pPr marL="0" indent="0" algn="just">
-              <a:buNone/>
-            </a:pPr>
-            <a:endParaRPr lang="pt-BR" sz="2400" dirty="0">
+              <a:rPr lang="pt-BR" sz="2000" dirty="0">
+                <a:latin typeface="Times New Roman" panose="02020603050405020304" pitchFamily="18" charset="0"/>
+                <a:cs typeface="Times New Roman" panose="02020603050405020304" pitchFamily="18" charset="0"/>
+                <a:hlinkClick r:id="rId4"/>
+              </a:rPr>
+              <a:t>https://books.google.com.br/books?hl=pt-BR&amp;lr=&amp;id=04cbCgAAQBAJ&amp;oi=fnd&amp;pg=PT5&amp;dq=Estiliza%C3%A7%C3%A3o+CSS+HTML&amp;ots=JttwDQX0Za&amp;sig=hDatOrM6nS37uFMOHLHtxBcaNeA#v=onepage&amp;q=Estiliza%C3%A7%C3%A3o%20CSS%20HTML&amp;f=false</a:t>
+            </a:r>
+            <a:endParaRPr lang="pt-BR" sz="2000" dirty="0">
               <a:latin typeface="Times New Roman" panose="02020603050405020304" pitchFamily="18" charset="0"/>
               <a:cs typeface="Times New Roman" panose="02020603050405020304" pitchFamily="18" charset="0"/>
             </a:endParaRPr>
@@ -22760,7 +22998,7 @@
     </p:spTree>
     <p:extLst>
       <p:ext uri="{BB962C8B-B14F-4D97-AF65-F5344CB8AC3E}">
-        <p14:creationId xmlns:p14="http://schemas.microsoft.com/office/powerpoint/2010/main" val="2747596967"/>
+        <p14:creationId xmlns:p14="http://schemas.microsoft.com/office/powerpoint/2010/main" val="3680270425"/>
       </p:ext>
     </p:extLst>
   </p:cSld>
@@ -22816,7 +23054,7 @@
                   <a:srgbClr val="0070C0"/>
                 </a:solidFill>
               </a:rPr>
-              <a:t>Dinâmica</a:t>
+              <a:t>Aprenda</a:t>
             </a:r>
             <a:r>
               <a:rPr lang="en-US" b="1" dirty="0">
@@ -22824,21 +23062,8 @@
                   <a:srgbClr val="0070C0"/>
                 </a:solidFill>
               </a:rPr>
-              <a:t>/</a:t>
-            </a:r>
-            <a:r>
-              <a:rPr lang="en-US" b="1" dirty="0" err="1">
-                <a:solidFill>
-                  <a:srgbClr val="0070C0"/>
-                </a:solidFill>
-              </a:rPr>
-              <a:t>Atividades</a:t>
-            </a:r>
-            <a:endParaRPr lang="en-US" b="1" dirty="0">
-              <a:solidFill>
-                <a:srgbClr val="0070C0"/>
-              </a:solidFill>
-            </a:endParaRPr>
+              <a:t>+</a:t>
+            </a:r>
           </a:p>
         </p:txBody>
       </p:sp>
@@ -22854,8 +23079,8 @@
         </p:nvSpPr>
         <p:spPr>
           <a:xfrm>
-            <a:off x="139472" y="1063230"/>
-            <a:ext cx="8865056" cy="3606305"/>
+            <a:off x="142865" y="1024786"/>
+            <a:ext cx="8865056" cy="3912733"/>
           </a:xfrm>
         </p:spPr>
         <p:txBody>
@@ -22864,45 +23089,37 @@
           </a:bodyPr>
           <a:lstStyle/>
           <a:p>
-            <a:pPr algn="just">
-              <a:buFontTx/>
-              <a:buChar char="-"/>
-            </a:pPr>
-            <a:r>
-              <a:rPr lang="pt-BR" dirty="0">
-                <a:latin typeface="Times New Roman" panose="02020603050405020304" pitchFamily="18" charset="0"/>
-                <a:cs typeface="Times New Roman" panose="02020603050405020304" pitchFamily="18" charset="0"/>
-              </a:rPr>
-              <a:t>Exercícios de Fixação </a:t>
-            </a:r>
-            <a:r>
-              <a:rPr lang="pt-BR" b="1" dirty="0">
-                <a:latin typeface="Times New Roman" panose="02020603050405020304" pitchFamily="18" charset="0"/>
-                <a:cs typeface="Times New Roman" panose="02020603050405020304" pitchFamily="18" charset="0"/>
-              </a:rPr>
-              <a:t>CSS</a:t>
-            </a:r>
-          </a:p>
-          <a:p>
             <a:pPr marL="0" indent="0" algn="just">
               <a:buNone/>
             </a:pPr>
             <a:r>
-              <a:rPr lang="pt-BR" dirty="0">
-                <a:latin typeface="Times New Roman" panose="02020603050405020304" pitchFamily="18" charset="0"/>
-                <a:cs typeface="Times New Roman" panose="02020603050405020304" pitchFamily="18" charset="0"/>
-              </a:rPr>
-              <a:t>	</a:t>
-            </a:r>
-            <a:r>
-              <a:rPr lang="pt-BR" dirty="0">
+              <a:rPr lang="pt-BR" sz="2400" dirty="0">
+                <a:latin typeface="Times New Roman" panose="02020603050405020304" pitchFamily="18" charset="0"/>
+                <a:cs typeface="Times New Roman" panose="02020603050405020304" pitchFamily="18" charset="0"/>
+              </a:rPr>
+              <a:t>[1] </a:t>
+            </a:r>
+            <a:r>
+              <a:rPr lang="pt-BR" sz="2400" dirty="0">
                 <a:latin typeface="Times New Roman" panose="02020603050405020304" pitchFamily="18" charset="0"/>
                 <a:cs typeface="Times New Roman" panose="02020603050405020304" pitchFamily="18" charset="0"/>
                 <a:hlinkClick r:id="rId3"/>
               </a:rPr>
-              <a:t>https://www.w3schools.com/css/css_exercises.asp</a:t>
-            </a:r>
-            <a:endParaRPr lang="pt-BR" dirty="0">
+              <a:t>https://www.youtube.com/watch?v=ieTHC78giGQ</a:t>
+            </a:r>
+            <a:r>
+              <a:rPr lang="pt-BR" sz="2400" dirty="0">
+                <a:latin typeface="Times New Roman" panose="02020603050405020304" pitchFamily="18" charset="0"/>
+                <a:cs typeface="Times New Roman" panose="02020603050405020304" pitchFamily="18" charset="0"/>
+              </a:rPr>
+              <a:t>  (CSS)</a:t>
+            </a:r>
+          </a:p>
+          <a:p>
+            <a:pPr marL="0" indent="0" algn="just">
+              <a:buNone/>
+            </a:pPr>
+            <a:endParaRPr lang="pt-BR" sz="2400" dirty="0">
               <a:latin typeface="Times New Roman" panose="02020603050405020304" pitchFamily="18" charset="0"/>
               <a:cs typeface="Times New Roman" panose="02020603050405020304" pitchFamily="18" charset="0"/>
             </a:endParaRPr>
@@ -22911,7 +23128,7 @@
             <a:pPr marL="0" indent="0" algn="just">
               <a:buNone/>
             </a:pPr>
-            <a:endParaRPr lang="pt-BR" dirty="0">
+            <a:endParaRPr lang="pt-BR" sz="2400" dirty="0">
               <a:latin typeface="Times New Roman" panose="02020603050405020304" pitchFamily="18" charset="0"/>
               <a:cs typeface="Times New Roman" panose="02020603050405020304" pitchFamily="18" charset="0"/>
             </a:endParaRPr>
@@ -22921,27 +23138,82 @@
               <a:buNone/>
             </a:pPr>
             <a:r>
-              <a:rPr lang="es-ES" dirty="0">
-                <a:latin typeface="Times New Roman" panose="02020603050405020304" pitchFamily="18" charset="0"/>
-                <a:cs typeface="Times New Roman" panose="02020603050405020304" pitchFamily="18" charset="0"/>
-              </a:rPr>
-              <a:t>- Quiz CSS</a:t>
+              <a:rPr lang="pt-BR" sz="2400" dirty="0">
+                <a:latin typeface="Times New Roman" panose="02020603050405020304" pitchFamily="18" charset="0"/>
+                <a:cs typeface="Times New Roman" panose="02020603050405020304" pitchFamily="18" charset="0"/>
+              </a:rPr>
+              <a:t>[2] </a:t>
+            </a:r>
+            <a:r>
+              <a:rPr lang="pt-BR" sz="2400" dirty="0">
+                <a:latin typeface="Times New Roman" panose="02020603050405020304" pitchFamily="18" charset="0"/>
+                <a:cs typeface="Times New Roman" panose="02020603050405020304" pitchFamily="18" charset="0"/>
+                <a:hlinkClick r:id="rId4"/>
+              </a:rPr>
+              <a:t>https://www.youtube.com/watch?v=Tfjd5yzCaxk</a:t>
+            </a:r>
+            <a:r>
+              <a:rPr lang="pt-BR" sz="2400" dirty="0">
+                <a:latin typeface="Times New Roman" panose="02020603050405020304" pitchFamily="18" charset="0"/>
+                <a:cs typeface="Times New Roman" panose="02020603050405020304" pitchFamily="18" charset="0"/>
+              </a:rPr>
+              <a:t> (CSS)</a:t>
             </a:r>
           </a:p>
           <a:p>
             <a:pPr marL="0" indent="0" algn="just">
               <a:buNone/>
             </a:pPr>
-            <a:r>
-              <a:rPr lang="es-ES" dirty="0">
-                <a:latin typeface="Times New Roman" panose="02020603050405020304" pitchFamily="18" charset="0"/>
-                <a:cs typeface="Times New Roman" panose="02020603050405020304" pitchFamily="18" charset="0"/>
-                <a:hlinkClick r:id="rId4"/>
-              </a:rPr>
-              <a:t>https://www.w3schools.com/css/css_quiz.asp</a:t>
-            </a:r>
-            <a:endParaRPr lang="pt-BR" dirty="0">
-              <a:latin typeface="Calibri" panose="020F0502020204030204" pitchFamily="34" charset="0"/>
+            <a:endParaRPr lang="pt-BR" sz="2400" dirty="0">
+              <a:latin typeface="Times New Roman" panose="02020603050405020304" pitchFamily="18" charset="0"/>
+              <a:cs typeface="Times New Roman" panose="02020603050405020304" pitchFamily="18" charset="0"/>
+            </a:endParaRPr>
+          </a:p>
+          <a:p>
+            <a:pPr marL="0" indent="0" algn="just">
+              <a:buNone/>
+            </a:pPr>
+            <a:r>
+              <a:rPr lang="pt-BR" sz="2400" dirty="0">
+                <a:latin typeface="Times New Roman" panose="02020603050405020304" pitchFamily="18" charset="0"/>
+                <a:cs typeface="Times New Roman" panose="02020603050405020304" pitchFamily="18" charset="0"/>
+              </a:rPr>
+              <a:t>[3]Exemplos de Box Model</a:t>
+            </a:r>
+          </a:p>
+          <a:p>
+            <a:pPr marL="0" indent="0" algn="just">
+              <a:buNone/>
+            </a:pPr>
+            <a:r>
+              <a:rPr lang="pt-BR" sz="2400" dirty="0">
+                <a:latin typeface="Times New Roman" panose="02020603050405020304" pitchFamily="18" charset="0"/>
+                <a:cs typeface="Times New Roman" panose="02020603050405020304" pitchFamily="18" charset="0"/>
+                <a:hlinkClick r:id="rId5"/>
+              </a:rPr>
+              <a:t>https://www.google.com.br/search?q=css+box+model&amp;num=100&amp;source=lnms&amp;tbm=isch&amp;sa=X&amp;ved=0ahUKEwioi_HwxZPYAhWJIZAKHTRVCYAQ_AUICigB&amp;biw=1366&amp;bih=677</a:t>
+            </a:r>
+            <a:endParaRPr lang="pt-BR" sz="2400" dirty="0">
+              <a:latin typeface="Times New Roman" panose="02020603050405020304" pitchFamily="18" charset="0"/>
+              <a:cs typeface="Times New Roman" panose="02020603050405020304" pitchFamily="18" charset="0"/>
+            </a:endParaRPr>
+          </a:p>
+          <a:p>
+            <a:pPr marL="0" indent="0" algn="just">
+              <a:buNone/>
+            </a:pPr>
+            <a:endParaRPr lang="pt-BR" sz="2400" dirty="0">
+              <a:latin typeface="Times New Roman" panose="02020603050405020304" pitchFamily="18" charset="0"/>
+              <a:cs typeface="Times New Roman" panose="02020603050405020304" pitchFamily="18" charset="0"/>
+            </a:endParaRPr>
+          </a:p>
+          <a:p>
+            <a:pPr marL="0" indent="0" algn="just">
+              <a:buNone/>
+            </a:pPr>
+            <a:endParaRPr lang="pt-BR" sz="2400" dirty="0">
+              <a:latin typeface="Times New Roman" panose="02020603050405020304" pitchFamily="18" charset="0"/>
+              <a:cs typeface="Times New Roman" panose="02020603050405020304" pitchFamily="18" charset="0"/>
             </a:endParaRPr>
           </a:p>
         </p:txBody>
@@ -22949,7 +23221,7 @@
     </p:spTree>
     <p:extLst>
       <p:ext uri="{BB962C8B-B14F-4D97-AF65-F5344CB8AC3E}">
-        <p14:creationId xmlns:p14="http://schemas.microsoft.com/office/powerpoint/2010/main" val="2470652989"/>
+        <p14:creationId xmlns:p14="http://schemas.microsoft.com/office/powerpoint/2010/main" val="2747596967"/>
       </p:ext>
     </p:extLst>
   </p:cSld>
@@ -23005,6 +23277,210 @@
                   <a:srgbClr val="0070C0"/>
                 </a:solidFill>
               </a:rPr>
+              <a:t>Dinâmica</a:t>
+            </a:r>
+            <a:r>
+              <a:rPr lang="en-US" b="1" dirty="0">
+                <a:solidFill>
+                  <a:srgbClr val="0070C0"/>
+                </a:solidFill>
+              </a:rPr>
+              <a:t>/</a:t>
+            </a:r>
+            <a:r>
+              <a:rPr lang="en-US" b="1" dirty="0" err="1">
+                <a:solidFill>
+                  <a:srgbClr val="0070C0"/>
+                </a:solidFill>
+              </a:rPr>
+              <a:t>Atividades</a:t>
+            </a:r>
+            <a:endParaRPr lang="en-US" b="1" dirty="0">
+              <a:solidFill>
+                <a:srgbClr val="0070C0"/>
+              </a:solidFill>
+            </a:endParaRPr>
+          </a:p>
+        </p:txBody>
+      </p:sp>
+      <p:sp>
+        <p:nvSpPr>
+          <p:cNvPr id="8" name="Text Placeholder 2"/>
+          <p:cNvSpPr>
+            <a:spLocks noGrp="1"/>
+          </p:cNvSpPr>
+          <p:nvPr>
+            <p:ph type="body" sz="half" idx="1"/>
+          </p:nvPr>
+        </p:nvSpPr>
+        <p:spPr>
+          <a:xfrm>
+            <a:off x="139472" y="1063230"/>
+            <a:ext cx="8865056" cy="3606305"/>
+          </a:xfrm>
+        </p:spPr>
+        <p:txBody>
+          <a:bodyPr>
+            <a:noAutofit/>
+          </a:bodyPr>
+          <a:lstStyle/>
+          <a:p>
+            <a:pPr algn="just">
+              <a:buFontTx/>
+              <a:buChar char="-"/>
+            </a:pPr>
+            <a:r>
+              <a:rPr lang="pt-BR" dirty="0">
+                <a:latin typeface="Times New Roman" panose="02020603050405020304" pitchFamily="18" charset="0"/>
+                <a:cs typeface="Times New Roman" panose="02020603050405020304" pitchFamily="18" charset="0"/>
+              </a:rPr>
+              <a:t>Exercícios de Fixação </a:t>
+            </a:r>
+            <a:r>
+              <a:rPr lang="pt-BR" b="1" dirty="0">
+                <a:latin typeface="Times New Roman" panose="02020603050405020304" pitchFamily="18" charset="0"/>
+                <a:cs typeface="Times New Roman" panose="02020603050405020304" pitchFamily="18" charset="0"/>
+              </a:rPr>
+              <a:t>CSS</a:t>
+            </a:r>
+          </a:p>
+          <a:p>
+            <a:pPr marL="0" indent="0" algn="just">
+              <a:buNone/>
+            </a:pPr>
+            <a:r>
+              <a:rPr lang="pt-BR" dirty="0">
+                <a:latin typeface="Times New Roman" panose="02020603050405020304" pitchFamily="18" charset="0"/>
+                <a:cs typeface="Times New Roman" panose="02020603050405020304" pitchFamily="18" charset="0"/>
+              </a:rPr>
+              <a:t>	</a:t>
+            </a:r>
+            <a:r>
+              <a:rPr lang="pt-BR" dirty="0">
+                <a:latin typeface="Times New Roman" panose="02020603050405020304" pitchFamily="18" charset="0"/>
+                <a:cs typeface="Times New Roman" panose="02020603050405020304" pitchFamily="18" charset="0"/>
+                <a:hlinkClick r:id="rId3"/>
+              </a:rPr>
+              <a:t>https://www.w3schools.com/css/css_exercises.asp</a:t>
+            </a:r>
+            <a:endParaRPr lang="pt-BR" dirty="0">
+              <a:latin typeface="Times New Roman" panose="02020603050405020304" pitchFamily="18" charset="0"/>
+              <a:cs typeface="Times New Roman" panose="02020603050405020304" pitchFamily="18" charset="0"/>
+            </a:endParaRPr>
+          </a:p>
+          <a:p>
+            <a:pPr marL="0" indent="0" algn="just">
+              <a:buNone/>
+            </a:pPr>
+            <a:endParaRPr lang="pt-BR" dirty="0">
+              <a:latin typeface="Times New Roman" panose="02020603050405020304" pitchFamily="18" charset="0"/>
+              <a:cs typeface="Times New Roman" panose="02020603050405020304" pitchFamily="18" charset="0"/>
+            </a:endParaRPr>
+          </a:p>
+          <a:p>
+            <a:pPr marL="0" indent="0" algn="just">
+              <a:buNone/>
+            </a:pPr>
+            <a:r>
+              <a:rPr lang="es-ES" dirty="0">
+                <a:latin typeface="Times New Roman" panose="02020603050405020304" pitchFamily="18" charset="0"/>
+                <a:cs typeface="Times New Roman" panose="02020603050405020304" pitchFamily="18" charset="0"/>
+              </a:rPr>
+              <a:t>- Quiz CSS</a:t>
+            </a:r>
+          </a:p>
+          <a:p>
+            <a:pPr marL="0" indent="0" algn="just">
+              <a:buNone/>
+            </a:pPr>
+            <a:r>
+              <a:rPr lang="pt-BR">
+                <a:latin typeface="Times New Roman" panose="02020603050405020304" pitchFamily="18" charset="0"/>
+                <a:cs typeface="Times New Roman" panose="02020603050405020304" pitchFamily="18" charset="0"/>
+              </a:rPr>
+              <a:t>	</a:t>
+            </a:r>
+            <a:r>
+              <a:rPr lang="es-ES">
+                <a:latin typeface="Times New Roman" panose="02020603050405020304" pitchFamily="18" charset="0"/>
+                <a:cs typeface="Times New Roman" panose="02020603050405020304" pitchFamily="18" charset="0"/>
+                <a:hlinkClick r:id="rId4"/>
+              </a:rPr>
+              <a:t>https</a:t>
+            </a:r>
+            <a:r>
+              <a:rPr lang="es-ES" dirty="0">
+                <a:latin typeface="Times New Roman" panose="02020603050405020304" pitchFamily="18" charset="0"/>
+                <a:cs typeface="Times New Roman" panose="02020603050405020304" pitchFamily="18" charset="0"/>
+                <a:hlinkClick r:id="rId4"/>
+              </a:rPr>
+              <a:t>://www.w3schools.com/css/css_quiz.asp</a:t>
+            </a:r>
+            <a:endParaRPr lang="pt-BR" dirty="0">
+              <a:latin typeface="Calibri" panose="020F0502020204030204" pitchFamily="34" charset="0"/>
+            </a:endParaRPr>
+          </a:p>
+        </p:txBody>
+      </p:sp>
+    </p:spTree>
+    <p:extLst>
+      <p:ext uri="{BB962C8B-B14F-4D97-AF65-F5344CB8AC3E}">
+        <p14:creationId xmlns:p14="http://schemas.microsoft.com/office/powerpoint/2010/main" val="2470652989"/>
+      </p:ext>
+    </p:extLst>
+  </p:cSld>
+  <p:clrMapOvr>
+    <a:masterClrMapping/>
+  </p:clrMapOvr>
+  <p:transition spd="med"/>
+</p:sld>
+</file>
+
+<file path=ppt/slides/slide58.xml><?xml version="1.0" encoding="utf-8"?>
+<p:sld xmlns:a="http://schemas.openxmlformats.org/drawingml/2006/main" xmlns:r="http://schemas.openxmlformats.org/officeDocument/2006/relationships" xmlns:p="http://schemas.openxmlformats.org/presentationml/2006/main">
+  <p:cSld>
+    <p:spTree>
+      <p:nvGrpSpPr>
+        <p:cNvPr id="1" name=""/>
+        <p:cNvGrpSpPr/>
+        <p:nvPr/>
+      </p:nvGrpSpPr>
+      <p:grpSpPr>
+        <a:xfrm>
+          <a:off x="0" y="0"/>
+          <a:ext cx="0" cy="0"/>
+          <a:chOff x="0" y="0"/>
+          <a:chExt cx="0" cy="0"/>
+        </a:xfrm>
+      </p:grpSpPr>
+      <p:sp>
+        <p:nvSpPr>
+          <p:cNvPr id="6" name="Title 1"/>
+          <p:cNvSpPr>
+            <a:spLocks noGrp="1"/>
+          </p:cNvSpPr>
+          <p:nvPr>
+            <p:ph type="title"/>
+          </p:nvPr>
+        </p:nvSpPr>
+        <p:spPr>
+          <a:xfrm>
+            <a:off x="457200" y="205980"/>
+            <a:ext cx="8229600" cy="857251"/>
+          </a:xfrm>
+        </p:spPr>
+        <p:txBody>
+          <a:bodyPr>
+            <a:normAutofit/>
+          </a:bodyPr>
+          <a:lstStyle/>
+          <a:p>
+            <a:r>
+              <a:rPr lang="en-US" b="1" dirty="0" err="1">
+                <a:solidFill>
+                  <a:srgbClr val="0070C0"/>
+                </a:solidFill>
+              </a:rPr>
               <a:t>Referências</a:t>
             </a:r>
             <a:r>
@@ -23249,7 +23725,7 @@
 </p:sld>
 </file>
 
-<file path=ppt/slides/slide58.xml><?xml version="1.0" encoding="utf-8"?>
+<file path=ppt/slides/slide59.xml><?xml version="1.0" encoding="utf-8"?>
 <p:sld xmlns:a="http://schemas.openxmlformats.org/drawingml/2006/main" xmlns:r="http://schemas.openxmlformats.org/officeDocument/2006/relationships" xmlns:p="http://schemas.openxmlformats.org/presentationml/2006/main">
   <p:cSld>
     <p:spTree>

</xml_diff>